<commit_message>
Updated class diagrams and wireframes
</commit_message>
<xml_diff>
--- a/docs/wireframes.pptx
+++ b/docs/wireframes.pptx
@@ -32,8 +32,10 @@
     <p:sldId id="280" r:id="rId26"/>
     <p:sldId id="281" r:id="rId27"/>
     <p:sldId id="282" r:id="rId28"/>
-    <p:sldId id="284" r:id="rId29"/>
-    <p:sldId id="285" r:id="rId30"/>
+    <p:sldId id="286" r:id="rId29"/>
+    <p:sldId id="284" r:id="rId30"/>
+    <p:sldId id="287" r:id="rId31"/>
+    <p:sldId id="285" r:id="rId32"/>
   </p:sldIdLst>
   <p:sldSz cx="12192000" cy="6858000"/>
   <p:notesSz cx="6858000" cy="9144000"/>
@@ -271,7 +273,7 @@
           <a:p>
             <a:fld id="{E739BB41-DB51-AC40-8BC3-82550C14AA6F}" type="datetimeFigureOut">
               <a:rPr lang="en-US" smtClean="0"/>
-              <a:t>10/14/18</a:t>
+              <a:t>10/16/18</a:t>
             </a:fld>
             <a:endParaRPr lang="en-US"/>
           </a:p>
@@ -441,7 +443,7 @@
           <a:p>
             <a:fld id="{E739BB41-DB51-AC40-8BC3-82550C14AA6F}" type="datetimeFigureOut">
               <a:rPr lang="en-US" smtClean="0"/>
-              <a:t>10/14/18</a:t>
+              <a:t>10/16/18</a:t>
             </a:fld>
             <a:endParaRPr lang="en-US"/>
           </a:p>
@@ -621,7 +623,7 @@
           <a:p>
             <a:fld id="{E739BB41-DB51-AC40-8BC3-82550C14AA6F}" type="datetimeFigureOut">
               <a:rPr lang="en-US" smtClean="0"/>
-              <a:t>10/14/18</a:t>
+              <a:t>10/16/18</a:t>
             </a:fld>
             <a:endParaRPr lang="en-US"/>
           </a:p>
@@ -791,7 +793,7 @@
           <a:p>
             <a:fld id="{E739BB41-DB51-AC40-8BC3-82550C14AA6F}" type="datetimeFigureOut">
               <a:rPr lang="en-US" smtClean="0"/>
-              <a:t>10/14/18</a:t>
+              <a:t>10/16/18</a:t>
             </a:fld>
             <a:endParaRPr lang="en-US"/>
           </a:p>
@@ -1037,7 +1039,7 @@
           <a:p>
             <a:fld id="{E739BB41-DB51-AC40-8BC3-82550C14AA6F}" type="datetimeFigureOut">
               <a:rPr lang="en-US" smtClean="0"/>
-              <a:t>10/14/18</a:t>
+              <a:t>10/16/18</a:t>
             </a:fld>
             <a:endParaRPr lang="en-US"/>
           </a:p>
@@ -1269,7 +1271,7 @@
           <a:p>
             <a:fld id="{E739BB41-DB51-AC40-8BC3-82550C14AA6F}" type="datetimeFigureOut">
               <a:rPr lang="en-US" smtClean="0"/>
-              <a:t>10/14/18</a:t>
+              <a:t>10/16/18</a:t>
             </a:fld>
             <a:endParaRPr lang="en-US"/>
           </a:p>
@@ -1636,7 +1638,7 @@
           <a:p>
             <a:fld id="{E739BB41-DB51-AC40-8BC3-82550C14AA6F}" type="datetimeFigureOut">
               <a:rPr lang="en-US" smtClean="0"/>
-              <a:t>10/14/18</a:t>
+              <a:t>10/16/18</a:t>
             </a:fld>
             <a:endParaRPr lang="en-US"/>
           </a:p>
@@ -1754,7 +1756,7 @@
           <a:p>
             <a:fld id="{E739BB41-DB51-AC40-8BC3-82550C14AA6F}" type="datetimeFigureOut">
               <a:rPr lang="en-US" smtClean="0"/>
-              <a:t>10/14/18</a:t>
+              <a:t>10/16/18</a:t>
             </a:fld>
             <a:endParaRPr lang="en-US"/>
           </a:p>
@@ -1849,7 +1851,7 @@
           <a:p>
             <a:fld id="{E739BB41-DB51-AC40-8BC3-82550C14AA6F}" type="datetimeFigureOut">
               <a:rPr lang="en-US" smtClean="0"/>
-              <a:t>10/14/18</a:t>
+              <a:t>10/16/18</a:t>
             </a:fld>
             <a:endParaRPr lang="en-US"/>
           </a:p>
@@ -2126,7 +2128,7 @@
           <a:p>
             <a:fld id="{E739BB41-DB51-AC40-8BC3-82550C14AA6F}" type="datetimeFigureOut">
               <a:rPr lang="en-US" smtClean="0"/>
-              <a:t>10/14/18</a:t>
+              <a:t>10/16/18</a:t>
             </a:fld>
             <a:endParaRPr lang="en-US"/>
           </a:p>
@@ -2383,7 +2385,7 @@
           <a:p>
             <a:fld id="{E739BB41-DB51-AC40-8BC3-82550C14AA6F}" type="datetimeFigureOut">
               <a:rPr lang="en-US" smtClean="0"/>
-              <a:t>10/14/18</a:t>
+              <a:t>10/16/18</a:t>
             </a:fld>
             <a:endParaRPr lang="en-US"/>
           </a:p>
@@ -2729,7 +2731,7 @@
           <a:p>
             <a:fld id="{E739BB41-DB51-AC40-8BC3-82550C14AA6F}" type="datetimeFigureOut">
               <a:rPr lang="en-US" smtClean="0"/>
-              <a:t>10/14/18</a:t>
+              <a:t>10/16/18</a:t>
             </a:fld>
             <a:endParaRPr lang="en-US"/>
           </a:p>
@@ -3214,9 +3216,10 @@
           <a:p>
             <a:pPr algn="ctr"/>
             <a:r>
-              <a:rPr lang="en-US" dirty="0"/>
-              <a:t>wireframes-demo-10-interactive-forms</a:t>
-            </a:r>
+              <a:rPr lang="en-US"/>
+              <a:t>wireframes-demo-10-forms</a:t>
+            </a:r>
+            <a:endParaRPr lang="en-US" dirty="0"/>
           </a:p>
         </p:txBody>
       </p:sp>
@@ -14674,7 +14677,7 @@
             <a:pPr algn="ctr"/>
             <a:r>
               <a:rPr lang="en-US" dirty="0"/>
-              <a:t>wireframes-demo-12-has-many-assoc</a:t>
+              <a:t>wireframes-demo-12-has-many-assoc-v1</a:t>
             </a:r>
           </a:p>
         </p:txBody>
@@ -15153,7 +15156,7 @@
         <p:spPr>
           <a:xfrm>
             <a:off x="2233351" y="581403"/>
-            <a:ext cx="2215671" cy="276999"/>
+            <a:ext cx="2972289" cy="276999"/>
           </a:xfrm>
           <a:prstGeom prst="rect">
             <a:avLst/>
@@ -15173,7 +15176,7 @@
                 </a:solidFill>
                 <a:latin typeface="Comic Sans MS" panose="030F0902030302020204" pitchFamily="66" charset="0"/>
               </a:rPr>
-              <a:t>http://localhost:3000/home</a:t>
+              <a:t>http://localhost:3000/quizzes/1/home</a:t>
             </a:r>
           </a:p>
         </p:txBody>
@@ -15791,7 +15794,7 @@
         <p:spPr>
           <a:xfrm>
             <a:off x="2233351" y="581403"/>
-            <a:ext cx="2215671" cy="276999"/>
+            <a:ext cx="2972289" cy="276999"/>
           </a:xfrm>
           <a:prstGeom prst="rect">
             <a:avLst/>
@@ -15811,7 +15814,7 @@
                 </a:solidFill>
                 <a:latin typeface="Comic Sans MS" panose="030F0902030302020204" pitchFamily="66" charset="0"/>
               </a:rPr>
-              <a:t>http://localhost:3000/home</a:t>
+              <a:t>http://localhost:3000/quizzes/1/home</a:t>
             </a:r>
           </a:p>
         </p:txBody>
@@ -15907,6 +15910,122 @@
       </p:grpSpPr>
       <p:sp>
         <p:nvSpPr>
+          <p:cNvPr id="4" name="Rectangle 3">
+            <a:extLst>
+              <a:ext uri="{FF2B5EF4-FFF2-40B4-BE49-F238E27FC236}">
+                <a16:creationId xmlns:a16="http://schemas.microsoft.com/office/drawing/2014/main" id="{3BA8FA19-7A14-EE4C-900E-67D16F2501AF}"/>
+              </a:ext>
+            </a:extLst>
+          </p:cNvPr>
+          <p:cNvSpPr/>
+          <p:nvPr/>
+        </p:nvSpPr>
+        <p:spPr>
+          <a:xfrm>
+            <a:off x="0" y="0"/>
+            <a:ext cx="12192000" cy="6858000"/>
+          </a:xfrm>
+          <a:prstGeom prst="rect">
+            <a:avLst/>
+          </a:prstGeom>
+          <a:solidFill>
+            <a:schemeClr val="bg1"/>
+          </a:solidFill>
+          <a:ln>
+            <a:noFill/>
+          </a:ln>
+        </p:spPr>
+        <p:style>
+          <a:lnRef idx="2">
+            <a:schemeClr val="accent1">
+              <a:shade val="50000"/>
+            </a:schemeClr>
+          </a:lnRef>
+          <a:fillRef idx="1">
+            <a:schemeClr val="accent1"/>
+          </a:fillRef>
+          <a:effectRef idx="0">
+            <a:schemeClr val="accent1"/>
+          </a:effectRef>
+          <a:fontRef idx="minor">
+            <a:schemeClr val="lt1"/>
+          </a:fontRef>
+        </p:style>
+        <p:txBody>
+          <a:bodyPr rtlCol="0" anchor="ctr"/>
+          <a:lstStyle/>
+          <a:p>
+            <a:pPr algn="ctr"/>
+            <a:endParaRPr lang="en-US" dirty="0"/>
+          </a:p>
+        </p:txBody>
+      </p:sp>
+      <p:sp>
+        <p:nvSpPr>
+          <p:cNvPr id="3" name="Title 2">
+            <a:extLst>
+              <a:ext uri="{FF2B5EF4-FFF2-40B4-BE49-F238E27FC236}">
+                <a16:creationId xmlns:a16="http://schemas.microsoft.com/office/drawing/2014/main" id="{5CC8491F-E8E1-F847-B1FC-6DD89B5706B4}"/>
+              </a:ext>
+            </a:extLst>
+          </p:cNvPr>
+          <p:cNvSpPr>
+            <a:spLocks noGrp="1"/>
+          </p:cNvSpPr>
+          <p:nvPr>
+            <p:ph type="title"/>
+          </p:nvPr>
+        </p:nvSpPr>
+        <p:spPr>
+          <a:xfrm>
+            <a:off x="838200" y="2766219"/>
+            <a:ext cx="10515600" cy="1325563"/>
+          </a:xfrm>
+        </p:spPr>
+        <p:txBody>
+          <a:bodyPr anchor="ctr"/>
+          <a:lstStyle/>
+          <a:p>
+            <a:pPr algn="ctr"/>
+            <a:r>
+              <a:rPr lang="en-US" dirty="0"/>
+              <a:t>wireframes-demo-12-has-many-assoc-v2</a:t>
+            </a:r>
+          </a:p>
+        </p:txBody>
+      </p:sp>
+    </p:spTree>
+    <p:extLst>
+      <p:ext uri="{BB962C8B-B14F-4D97-AF65-F5344CB8AC3E}">
+        <p14:creationId xmlns:p14="http://schemas.microsoft.com/office/powerpoint/2010/main" val="3073781012"/>
+      </p:ext>
+    </p:extLst>
+  </p:cSld>
+  <p:clrMapOvr>
+    <a:masterClrMapping/>
+  </p:clrMapOvr>
+</p:sld>
+</file>
+
+<file path=ppt/slides/slide29.xml><?xml version="1.0" encoding="utf-8"?>
+<p:sld xmlns:a="http://schemas.openxmlformats.org/drawingml/2006/main" xmlns:r="http://schemas.openxmlformats.org/officeDocument/2006/relationships" xmlns:p="http://schemas.openxmlformats.org/presentationml/2006/main">
+  <p:cSld>
+    <p:spTree>
+      <p:nvGrpSpPr>
+        <p:cNvPr id="1" name=""/>
+        <p:cNvGrpSpPr/>
+        <p:nvPr/>
+      </p:nvGrpSpPr>
+      <p:grpSpPr>
+        <a:xfrm>
+          <a:off x="0" y="0"/>
+          <a:ext cx="0" cy="0"/>
+          <a:chOff x="0" y="0"/>
+          <a:chExt cx="0" cy="0"/>
+        </a:xfrm>
+      </p:grpSpPr>
+      <p:sp>
+        <p:nvSpPr>
           <p:cNvPr id="2" name="TextBox 1">
             <a:extLst>
               <a:ext uri="{FF2B5EF4-FFF2-40B4-BE49-F238E27FC236}">
@@ -16000,7 +16119,7 @@
         <p:spPr>
           <a:xfrm>
             <a:off x="2233351" y="581403"/>
-            <a:ext cx="3804247" cy="276999"/>
+            <a:ext cx="2451312" cy="276999"/>
           </a:xfrm>
           <a:prstGeom prst="rect">
             <a:avLst/>
@@ -16020,7 +16139,7 @@
                 </a:solidFill>
                 <a:latin typeface="Comic Sans MS" panose="030F0902030302020204" pitchFamily="66" charset="0"/>
               </a:rPr>
-              <a:t>http://localhost:3000/multiple_choice_questions/</a:t>
+              <a:t>http://localhost:3000/quizzes</a:t>
             </a:r>
           </a:p>
         </p:txBody>
@@ -16040,7 +16159,7 @@
           <p:nvPr>
             <p:extLst>
               <p:ext uri="{D42A27DB-BD31-4B8C-83A1-F6EECF244321}">
-                <p14:modId xmlns:p14="http://schemas.microsoft.com/office/powerpoint/2010/main" val="1197373547"/>
+                <p14:modId xmlns:p14="http://schemas.microsoft.com/office/powerpoint/2010/main" val="2453304786"/>
               </p:ext>
             </p:extLst>
           </p:nvPr>
@@ -16375,7 +16494,7 @@
                           </a:solidFill>
                           <a:latin typeface="Comic Sans MS" panose="030F0902030302020204" pitchFamily="66" charset="0"/>
                         </a:rPr>
-                        <a:t>Edit</a:t>
+                        <a:t>Show</a:t>
                       </a:r>
                       <a:r>
                         <a:rPr lang="en-US" sz="1200" u="none" dirty="0">
@@ -16386,181 +16505,6 @@
                         </a:rPr>
                         <a:t> </a:t>
                       </a:r>
-                      <a:r>
-                        <a:rPr lang="en-US" sz="1200" u="sng" dirty="0">
-                          <a:solidFill>
-                            <a:srgbClr val="0432FF"/>
-                          </a:solidFill>
-                          <a:latin typeface="Comic Sans MS" panose="030F0902030302020204" pitchFamily="66" charset="0"/>
-                        </a:rPr>
-                        <a:t>Destroy</a:t>
-                      </a:r>
-                    </a:p>
-                  </a:txBody>
-                  <a:tcPr>
-                    <a:lnL w="12700" cap="flat" cmpd="sng" algn="ctr">
-                      <a:solidFill>
-                        <a:schemeClr val="bg1"/>
-                      </a:solidFill>
-                      <a:prstDash val="solid"/>
-                      <a:round/>
-                      <a:headEnd type="none" w="med" len="med"/>
-                      <a:tailEnd type="none" w="med" len="med"/>
-                    </a:lnL>
-                    <a:lnR w="12700" cap="flat" cmpd="sng" algn="ctr">
-                      <a:solidFill>
-                        <a:schemeClr val="bg1"/>
-                      </a:solidFill>
-                      <a:prstDash val="solid"/>
-                      <a:round/>
-                      <a:headEnd type="none" w="med" len="med"/>
-                      <a:tailEnd type="none" w="med" len="med"/>
-                    </a:lnR>
-                    <a:lnT w="12700" cap="flat" cmpd="sng" algn="ctr">
-                      <a:solidFill>
-                        <a:schemeClr val="bg1"/>
-                      </a:solidFill>
-                      <a:prstDash val="solid"/>
-                      <a:round/>
-                      <a:headEnd type="none" w="med" len="med"/>
-                      <a:tailEnd type="none" w="med" len="med"/>
-                    </a:lnT>
-                    <a:lnB w="12700" cap="flat" cmpd="sng" algn="ctr">
-                      <a:solidFill>
-                        <a:schemeClr val="bg1"/>
-                      </a:solidFill>
-                      <a:prstDash val="solid"/>
-                      <a:round/>
-                      <a:headEnd type="none" w="med" len="med"/>
-                      <a:tailEnd type="none" w="med" len="med"/>
-                    </a:lnB>
-                    <a:noFill/>
-                  </a:tcPr>
-                </a:tc>
-                <a:extLst>
-                  <a:ext uri="{0D108BD9-81ED-4DB2-BD59-A6C34878D82A}">
-                    <a16:rowId xmlns:a16="http://schemas.microsoft.com/office/drawing/2014/main" val="2617531180"/>
-                  </a:ext>
-                </a:extLst>
-              </a:tr>
-              <a:tr h="370840">
-                <a:tc>
-                  <a:txBody>
-                    <a:bodyPr/>
-                    <a:lstStyle/>
-                    <a:p>
-                      <a:r>
-                        <a:rPr lang="en-US" sz="1200" dirty="0">
-                          <a:solidFill>
-                            <a:schemeClr val="bg1"/>
-                          </a:solidFill>
-                          <a:latin typeface="Comic Sans MS" panose="030F0902030302020204" pitchFamily="66" charset="0"/>
-                        </a:rPr>
-                        <a:t>Git</a:t>
-                      </a:r>
-                    </a:p>
-                  </a:txBody>
-                  <a:tcPr>
-                    <a:lnL w="12700" cap="flat" cmpd="sng" algn="ctr">
-                      <a:solidFill>
-                        <a:schemeClr val="bg1"/>
-                      </a:solidFill>
-                      <a:prstDash val="solid"/>
-                      <a:round/>
-                      <a:headEnd type="none" w="med" len="med"/>
-                      <a:tailEnd type="none" w="med" len="med"/>
-                    </a:lnL>
-                    <a:lnR w="12700" cap="flat" cmpd="sng" algn="ctr">
-                      <a:solidFill>
-                        <a:schemeClr val="bg1"/>
-                      </a:solidFill>
-                      <a:prstDash val="solid"/>
-                      <a:round/>
-                      <a:headEnd type="none" w="med" len="med"/>
-                      <a:tailEnd type="none" w="med" len="med"/>
-                    </a:lnR>
-                    <a:lnT w="12700" cap="flat" cmpd="sng" algn="ctr">
-                      <a:solidFill>
-                        <a:schemeClr val="bg1"/>
-                      </a:solidFill>
-                      <a:prstDash val="solid"/>
-                      <a:round/>
-                      <a:headEnd type="none" w="med" len="med"/>
-                      <a:tailEnd type="none" w="med" len="med"/>
-                    </a:lnT>
-                    <a:lnB w="12700" cap="flat" cmpd="sng" algn="ctr">
-                      <a:solidFill>
-                        <a:schemeClr val="bg1"/>
-                      </a:solidFill>
-                      <a:prstDash val="solid"/>
-                      <a:round/>
-                      <a:headEnd type="none" w="med" len="med"/>
-                      <a:tailEnd type="none" w="med" len="med"/>
-                    </a:lnB>
-                    <a:noFill/>
-                  </a:tcPr>
-                </a:tc>
-                <a:tc>
-                  <a:txBody>
-                    <a:bodyPr/>
-                    <a:lstStyle/>
-                    <a:p>
-                      <a:r>
-                        <a:rPr lang="en-US" sz="1200" dirty="0">
-                          <a:solidFill>
-                            <a:schemeClr val="bg1"/>
-                          </a:solidFill>
-                          <a:latin typeface="Comic Sans MS" panose="030F0902030302020204" pitchFamily="66" charset="0"/>
-                        </a:rPr>
-                        <a:t>Covers data organization, operations, and common use cases in the Git distributed version control system.</a:t>
-                      </a:r>
-                    </a:p>
-                  </a:txBody>
-                  <a:tcPr>
-                    <a:lnL w="12700" cap="flat" cmpd="sng" algn="ctr">
-                      <a:solidFill>
-                        <a:schemeClr val="bg1"/>
-                      </a:solidFill>
-                      <a:prstDash val="solid"/>
-                      <a:round/>
-                      <a:headEnd type="none" w="med" len="med"/>
-                      <a:tailEnd type="none" w="med" len="med"/>
-                    </a:lnL>
-                    <a:lnR w="12700" cap="flat" cmpd="sng" algn="ctr">
-                      <a:solidFill>
-                        <a:schemeClr val="bg1"/>
-                      </a:solidFill>
-                      <a:prstDash val="solid"/>
-                      <a:round/>
-                      <a:headEnd type="none" w="med" len="med"/>
-                      <a:tailEnd type="none" w="med" len="med"/>
-                    </a:lnR>
-                    <a:lnT w="12700" cap="flat" cmpd="sng" algn="ctr">
-                      <a:solidFill>
-                        <a:schemeClr val="bg1"/>
-                      </a:solidFill>
-                      <a:prstDash val="solid"/>
-                      <a:round/>
-                      <a:headEnd type="none" w="med" len="med"/>
-                      <a:tailEnd type="none" w="med" len="med"/>
-                    </a:lnT>
-                    <a:lnB w="12700" cap="flat" cmpd="sng" algn="ctr">
-                      <a:solidFill>
-                        <a:schemeClr val="bg1"/>
-                      </a:solidFill>
-                      <a:prstDash val="solid"/>
-                      <a:round/>
-                      <a:headEnd type="none" w="med" len="med"/>
-                      <a:tailEnd type="none" w="med" len="med"/>
-                    </a:lnB>
-                    <a:noFill/>
-                  </a:tcPr>
-                </a:tc>
-                <a:tc>
-                  <a:txBody>
-                    <a:bodyPr/>
-                    <a:lstStyle/>
-                    <a:p>
                       <a:r>
                         <a:rPr lang="en-US" sz="1200" u="sng" dirty="0">
                           <a:solidFill>
@@ -16632,6 +16576,217 @@
                 </a:tc>
                 <a:extLst>
                   <a:ext uri="{0D108BD9-81ED-4DB2-BD59-A6C34878D82A}">
+                    <a16:rowId xmlns:a16="http://schemas.microsoft.com/office/drawing/2014/main" val="2617531180"/>
+                  </a:ext>
+                </a:extLst>
+              </a:tr>
+              <a:tr h="370840">
+                <a:tc>
+                  <a:txBody>
+                    <a:bodyPr/>
+                    <a:lstStyle/>
+                    <a:p>
+                      <a:r>
+                        <a:rPr lang="en-US" sz="1200" dirty="0">
+                          <a:solidFill>
+                            <a:schemeClr val="bg1"/>
+                          </a:solidFill>
+                          <a:latin typeface="Comic Sans MS" panose="030F0902030302020204" pitchFamily="66" charset="0"/>
+                        </a:rPr>
+                        <a:t>Git</a:t>
+                      </a:r>
+                    </a:p>
+                  </a:txBody>
+                  <a:tcPr>
+                    <a:lnL w="12700" cap="flat" cmpd="sng" algn="ctr">
+                      <a:solidFill>
+                        <a:schemeClr val="bg1"/>
+                      </a:solidFill>
+                      <a:prstDash val="solid"/>
+                      <a:round/>
+                      <a:headEnd type="none" w="med" len="med"/>
+                      <a:tailEnd type="none" w="med" len="med"/>
+                    </a:lnL>
+                    <a:lnR w="12700" cap="flat" cmpd="sng" algn="ctr">
+                      <a:solidFill>
+                        <a:schemeClr val="bg1"/>
+                      </a:solidFill>
+                      <a:prstDash val="solid"/>
+                      <a:round/>
+                      <a:headEnd type="none" w="med" len="med"/>
+                      <a:tailEnd type="none" w="med" len="med"/>
+                    </a:lnR>
+                    <a:lnT w="12700" cap="flat" cmpd="sng" algn="ctr">
+                      <a:solidFill>
+                        <a:schemeClr val="bg1"/>
+                      </a:solidFill>
+                      <a:prstDash val="solid"/>
+                      <a:round/>
+                      <a:headEnd type="none" w="med" len="med"/>
+                      <a:tailEnd type="none" w="med" len="med"/>
+                    </a:lnT>
+                    <a:lnB w="12700" cap="flat" cmpd="sng" algn="ctr">
+                      <a:solidFill>
+                        <a:schemeClr val="bg1"/>
+                      </a:solidFill>
+                      <a:prstDash val="solid"/>
+                      <a:round/>
+                      <a:headEnd type="none" w="med" len="med"/>
+                      <a:tailEnd type="none" w="med" len="med"/>
+                    </a:lnB>
+                    <a:noFill/>
+                  </a:tcPr>
+                </a:tc>
+                <a:tc>
+                  <a:txBody>
+                    <a:bodyPr/>
+                    <a:lstStyle/>
+                    <a:p>
+                      <a:r>
+                        <a:rPr lang="en-US" sz="1200" dirty="0">
+                          <a:solidFill>
+                            <a:schemeClr val="bg1"/>
+                          </a:solidFill>
+                          <a:latin typeface="Comic Sans MS" panose="030F0902030302020204" pitchFamily="66" charset="0"/>
+                        </a:rPr>
+                        <a:t>Covers data organization, operations, and common use cases in the Git distributed version control system.</a:t>
+                      </a:r>
+                    </a:p>
+                  </a:txBody>
+                  <a:tcPr>
+                    <a:lnL w="12700" cap="flat" cmpd="sng" algn="ctr">
+                      <a:solidFill>
+                        <a:schemeClr val="bg1"/>
+                      </a:solidFill>
+                      <a:prstDash val="solid"/>
+                      <a:round/>
+                      <a:headEnd type="none" w="med" len="med"/>
+                      <a:tailEnd type="none" w="med" len="med"/>
+                    </a:lnL>
+                    <a:lnR w="12700" cap="flat" cmpd="sng" algn="ctr">
+                      <a:solidFill>
+                        <a:schemeClr val="bg1"/>
+                      </a:solidFill>
+                      <a:prstDash val="solid"/>
+                      <a:round/>
+                      <a:headEnd type="none" w="med" len="med"/>
+                      <a:tailEnd type="none" w="med" len="med"/>
+                    </a:lnR>
+                    <a:lnT w="12700" cap="flat" cmpd="sng" algn="ctr">
+                      <a:solidFill>
+                        <a:schemeClr val="bg1"/>
+                      </a:solidFill>
+                      <a:prstDash val="solid"/>
+                      <a:round/>
+                      <a:headEnd type="none" w="med" len="med"/>
+                      <a:tailEnd type="none" w="med" len="med"/>
+                    </a:lnT>
+                    <a:lnB w="12700" cap="flat" cmpd="sng" algn="ctr">
+                      <a:solidFill>
+                        <a:schemeClr val="bg1"/>
+                      </a:solidFill>
+                      <a:prstDash val="solid"/>
+                      <a:round/>
+                      <a:headEnd type="none" w="med" len="med"/>
+                      <a:tailEnd type="none" w="med" len="med"/>
+                    </a:lnB>
+                    <a:noFill/>
+                  </a:tcPr>
+                </a:tc>
+                <a:tc>
+                  <a:txBody>
+                    <a:bodyPr/>
+                    <a:lstStyle/>
+                    <a:p>
+                      <a:r>
+                        <a:rPr lang="en-US" sz="1200" u="sng" dirty="0">
+                          <a:solidFill>
+                            <a:srgbClr val="0432FF"/>
+                          </a:solidFill>
+                          <a:latin typeface="Comic Sans MS" panose="030F0902030302020204" pitchFamily="66" charset="0"/>
+                        </a:rPr>
+                        <a:t>Show</a:t>
+                      </a:r>
+                      <a:r>
+                        <a:rPr lang="en-US" sz="1200" u="none" dirty="0">
+                          <a:solidFill>
+                            <a:srgbClr val="0432FF"/>
+                          </a:solidFill>
+                          <a:latin typeface="Comic Sans MS" panose="030F0902030302020204" pitchFamily="66" charset="0"/>
+                        </a:rPr>
+                        <a:t> </a:t>
+                      </a:r>
+                      <a:r>
+                        <a:rPr lang="en-US" sz="1200" u="sng" dirty="0">
+                          <a:solidFill>
+                            <a:srgbClr val="0432FF"/>
+                          </a:solidFill>
+                          <a:latin typeface="Comic Sans MS" panose="030F0902030302020204" pitchFamily="66" charset="0"/>
+                        </a:rPr>
+                        <a:t>Edit</a:t>
+                      </a:r>
+                      <a:r>
+                        <a:rPr lang="en-US" sz="1200" u="none" dirty="0">
+                          <a:solidFill>
+                            <a:srgbClr val="0432FF"/>
+                          </a:solidFill>
+                          <a:latin typeface="Comic Sans MS" panose="030F0902030302020204" pitchFamily="66" charset="0"/>
+                        </a:rPr>
+                        <a:t> </a:t>
+                      </a:r>
+                      <a:r>
+                        <a:rPr lang="en-US" sz="1200" u="sng" dirty="0">
+                          <a:solidFill>
+                            <a:srgbClr val="0432FF"/>
+                          </a:solidFill>
+                          <a:latin typeface="Comic Sans MS" panose="030F0902030302020204" pitchFamily="66" charset="0"/>
+                        </a:rPr>
+                        <a:t>Destroy</a:t>
+                      </a:r>
+                    </a:p>
+                  </a:txBody>
+                  <a:tcPr>
+                    <a:lnL w="12700" cap="flat" cmpd="sng" algn="ctr">
+                      <a:solidFill>
+                        <a:schemeClr val="bg1"/>
+                      </a:solidFill>
+                      <a:prstDash val="solid"/>
+                      <a:round/>
+                      <a:headEnd type="none" w="med" len="med"/>
+                      <a:tailEnd type="none" w="med" len="med"/>
+                    </a:lnL>
+                    <a:lnR w="12700" cap="flat" cmpd="sng" algn="ctr">
+                      <a:solidFill>
+                        <a:schemeClr val="bg1"/>
+                      </a:solidFill>
+                      <a:prstDash val="solid"/>
+                      <a:round/>
+                      <a:headEnd type="none" w="med" len="med"/>
+                      <a:tailEnd type="none" w="med" len="med"/>
+                    </a:lnR>
+                    <a:lnT w="12700" cap="flat" cmpd="sng" algn="ctr">
+                      <a:solidFill>
+                        <a:schemeClr val="bg1"/>
+                      </a:solidFill>
+                      <a:prstDash val="solid"/>
+                      <a:round/>
+                      <a:headEnd type="none" w="med" len="med"/>
+                      <a:tailEnd type="none" w="med" len="med"/>
+                    </a:lnT>
+                    <a:lnB w="12700" cap="flat" cmpd="sng" algn="ctr">
+                      <a:solidFill>
+                        <a:schemeClr val="bg1"/>
+                      </a:solidFill>
+                      <a:prstDash val="solid"/>
+                      <a:round/>
+                      <a:headEnd type="none" w="med" len="med"/>
+                      <a:tailEnd type="none" w="med" len="med"/>
+                    </a:lnB>
+                    <a:noFill/>
+                  </a:tcPr>
+                </a:tc>
+                <a:extLst>
+                  <a:ext uri="{0D108BD9-81ED-4DB2-BD59-A6C34878D82A}">
                     <a16:rowId xmlns:a16="http://schemas.microsoft.com/office/drawing/2014/main" val="2830196396"/>
                   </a:ext>
                 </a:extLst>
@@ -16754,6 +16909,24 @@
                     <a:bodyPr/>
                     <a:lstStyle/>
                     <a:p>
+                      <a:r>
+                        <a:rPr lang="en-US" sz="1200" u="sng" dirty="0">
+                          <a:solidFill>
+                            <a:srgbClr val="0432FF"/>
+                          </a:solidFill>
+                          <a:latin typeface="Comic Sans MS" panose="030F0902030302020204" pitchFamily="66" charset="0"/>
+                        </a:rPr>
+                        <a:t>Show</a:t>
+                      </a:r>
+                      <a:r>
+                        <a:rPr lang="en-US" sz="1200" u="none" dirty="0">
+                          <a:solidFill>
+                            <a:srgbClr val="0432FF"/>
+                          </a:solidFill>
+                          <a:latin typeface="Comic Sans MS" panose="030F0902030302020204" pitchFamily="66" charset="0"/>
+                        </a:rPr>
+                        <a:t> </a:t>
+                      </a:r>
                       <a:r>
                         <a:rPr lang="en-US" sz="1200" u="sng" dirty="0">
                           <a:solidFill>
@@ -16955,7 +17128,7 @@
 </p:sld>
 </file>
 
-<file path=ppt/slides/slide29.xml><?xml version="1.0" encoding="utf-8"?>
+<file path=ppt/slides/slide3.xml><?xml version="1.0" encoding="utf-8"?>
 <p:sld xmlns:a="http://schemas.openxmlformats.org/drawingml/2006/main" xmlns:r="http://schemas.openxmlformats.org/officeDocument/2006/relationships" xmlns:p="http://schemas.openxmlformats.org/presentationml/2006/main">
   <p:cSld>
     <p:spTree>
@@ -16986,8 +17159,8 @@
         </p:nvSpPr>
         <p:spPr>
           <a:xfrm>
-            <a:off x="1390398" y="1266033"/>
-            <a:ext cx="1132041" cy="338554"/>
+            <a:off x="1389412" y="1266033"/>
+            <a:ext cx="3212739" cy="2062103"/>
           </a:xfrm>
           <a:prstGeom prst="rect">
             <a:avLst/>
@@ -17007,7 +17180,109 @@
                 </a:solidFill>
                 <a:latin typeface="Comic Sans MS" panose="030F0902030302020204" pitchFamily="66" charset="0"/>
               </a:rPr>
-              <a:t>Edit Quiz</a:t>
+              <a:t>Answer This Question</a:t>
+            </a:r>
+          </a:p>
+          <a:p>
+            <a:endParaRPr lang="en-US" sz="1400" dirty="0">
+              <a:solidFill>
+                <a:schemeClr val="bg1"/>
+              </a:solidFill>
+              <a:latin typeface="Comic Sans MS" panose="030F0902030302020204" pitchFamily="66" charset="0"/>
+            </a:endParaRPr>
+          </a:p>
+          <a:p>
+            <a:r>
+              <a:rPr lang="en-US" sz="1400" dirty="0">
+                <a:solidFill>
+                  <a:schemeClr val="bg1"/>
+                </a:solidFill>
+                <a:latin typeface="Comic Sans MS" panose="030F0902030302020204" pitchFamily="66" charset="0"/>
+              </a:rPr>
+              <a:t>What does the M in MVC stand for?</a:t>
+            </a:r>
+          </a:p>
+          <a:p>
+            <a:endParaRPr lang="en-US" sz="1400" dirty="0">
+              <a:solidFill>
+                <a:schemeClr val="bg1"/>
+              </a:solidFill>
+              <a:latin typeface="Comic Sans MS" panose="030F0902030302020204" pitchFamily="66" charset="0"/>
+            </a:endParaRPr>
+          </a:p>
+          <a:p>
+            <a:pPr marL="285750" indent="-285750">
+              <a:buFont typeface=".PingFang SC Regular"/>
+              <a:buChar char="◎"/>
+            </a:pPr>
+            <a:r>
+              <a:rPr lang="en-US" sz="1400" dirty="0">
+                <a:solidFill>
+                  <a:schemeClr val="bg1"/>
+                </a:solidFill>
+                <a:latin typeface="Comic Sans MS" panose="030F0902030302020204" pitchFamily="66" charset="0"/>
+              </a:rPr>
+              <a:t>Model</a:t>
+            </a:r>
+          </a:p>
+          <a:p>
+            <a:pPr marL="285750" indent="-285750">
+              <a:buFont typeface=".PingFang SC Regular"/>
+              <a:buChar char="◎"/>
+            </a:pPr>
+            <a:r>
+              <a:rPr lang="en-US" sz="1400" dirty="0">
+                <a:solidFill>
+                  <a:schemeClr val="bg1"/>
+                </a:solidFill>
+                <a:latin typeface="Comic Sans MS" panose="030F0902030302020204" pitchFamily="66" charset="0"/>
+              </a:rPr>
+              <a:t>Main</a:t>
+            </a:r>
+          </a:p>
+          <a:p>
+            <a:pPr marL="285750" indent="-285750">
+              <a:buFont typeface=".PingFang SC Regular"/>
+              <a:buChar char="◎"/>
+            </a:pPr>
+            <a:r>
+              <a:rPr lang="en-US" sz="1400" dirty="0">
+                <a:solidFill>
+                  <a:schemeClr val="bg1"/>
+                </a:solidFill>
+                <a:latin typeface="Comic Sans MS" panose="030F0902030302020204" pitchFamily="66" charset="0"/>
+              </a:rPr>
+              <a:t>Mode</a:t>
+            </a:r>
+          </a:p>
+          <a:p>
+            <a:pPr marL="285750" indent="-285750">
+              <a:buFont typeface=".PingFang SC Regular"/>
+              <a:buChar char="◎"/>
+            </a:pPr>
+            <a:r>
+              <a:rPr lang="en-US" sz="1400" dirty="0">
+                <a:solidFill>
+                  <a:schemeClr val="bg1"/>
+                </a:solidFill>
+                <a:latin typeface="Comic Sans MS" panose="030F0902030302020204" pitchFamily="66" charset="0"/>
+              </a:rPr>
+              <a:t>Module</a:t>
+            </a:r>
+          </a:p>
+          <a:p>
+            <a:pPr marL="285750" indent="-285750">
+              <a:buFont typeface=".PingFang SC Regular"/>
+              <a:buChar char="◎"/>
+            </a:pPr>
+            <a:r>
+              <a:rPr lang="en-US" sz="1400" dirty="0">
+                <a:solidFill>
+                  <a:schemeClr val="bg1"/>
+                </a:solidFill>
+                <a:latin typeface="Comic Sans MS" panose="030F0902030302020204" pitchFamily="66" charset="0"/>
+              </a:rPr>
+              <a:t>Max</a:t>
             </a:r>
           </a:p>
         </p:txBody>
@@ -17027,7 +17302,7 @@
         <p:spPr>
           <a:xfrm>
             <a:off x="1784068" y="292529"/>
-            <a:ext cx="873957" cy="276999"/>
+            <a:ext cx="1771639" cy="276999"/>
           </a:xfrm>
           <a:prstGeom prst="rect">
             <a:avLst/>
@@ -17047,7 +17322,7 @@
                 </a:solidFill>
                 <a:latin typeface="Comic Sans MS" panose="030F0902030302020204" pitchFamily="66" charset="0"/>
               </a:rPr>
-              <a:t>Edit Quiz</a:t>
+              <a:t>Answer This Question</a:t>
             </a:r>
           </a:p>
         </p:txBody>
@@ -17067,7 +17342,7 @@
         <p:spPr>
           <a:xfrm>
             <a:off x="2233351" y="581403"/>
-            <a:ext cx="4241867" cy="276999"/>
+            <a:ext cx="4188967" cy="276999"/>
           </a:xfrm>
           <a:prstGeom prst="rect">
             <a:avLst/>
@@ -17087,321 +17362,35 @@
                 </a:solidFill>
                 <a:latin typeface="Comic Sans MS" panose="030F0902030302020204" pitchFamily="66" charset="0"/>
               </a:rPr>
-              <a:t>http://localhost:3000/multiple_choice_questions/2/edit</a:t>
-            </a:r>
-          </a:p>
-        </p:txBody>
-      </p:sp>
-      <p:sp>
-        <p:nvSpPr>
-          <p:cNvPr id="10" name="TextBox 9">
-            <a:extLst>
-              <a:ext uri="{FF2B5EF4-FFF2-40B4-BE49-F238E27FC236}">
-                <a16:creationId xmlns:a16="http://schemas.microsoft.com/office/drawing/2014/main" id="{C8E10E37-1019-8D4C-BA6F-9A6E9CF0D317}"/>
-              </a:ext>
-            </a:extLst>
-          </p:cNvPr>
-          <p:cNvSpPr txBox="1"/>
-          <p:nvPr/>
-        </p:nvSpPr>
-        <p:spPr>
-          <a:xfrm>
-            <a:off x="1390398" y="1666283"/>
-            <a:ext cx="8706102" cy="4832092"/>
-          </a:xfrm>
-          <a:prstGeom prst="rect">
-            <a:avLst/>
-          </a:prstGeom>
-          <a:noFill/>
-        </p:spPr>
-        <p:txBody>
-          <a:bodyPr wrap="square" rtlCol="0">
-            <a:spAutoFit/>
-          </a:bodyPr>
-          <a:lstStyle/>
-          <a:p>
-            <a:r>
-              <a:rPr lang="en-US" sz="1400" dirty="0">
+              <a:t>http://localhost:3000/</a:t>
+            </a:r>
+            <a:r>
+              <a:rPr lang="en-US" sz="1200" dirty="0" err="1">
                 <a:solidFill>
                   <a:schemeClr val="bg1"/>
                 </a:solidFill>
                 <a:latin typeface="Comic Sans MS" panose="030F0902030302020204" pitchFamily="66" charset="0"/>
               </a:rPr>
-              <a:t>Title</a:t>
-            </a:r>
-          </a:p>
-          <a:p>
-            <a:endParaRPr lang="en-US" sz="1400" dirty="0">
-              <a:solidFill>
-                <a:schemeClr val="bg1"/>
-              </a:solidFill>
-              <a:latin typeface="Comic Sans MS" panose="030F0902030302020204" pitchFamily="66" charset="0"/>
-            </a:endParaRPr>
-          </a:p>
-          <a:p>
-            <a:endParaRPr lang="en-US" sz="1400" dirty="0">
-              <a:solidFill>
-                <a:schemeClr val="bg1"/>
-              </a:solidFill>
-              <a:latin typeface="Comic Sans MS" panose="030F0902030302020204" pitchFamily="66" charset="0"/>
-            </a:endParaRPr>
-          </a:p>
-          <a:p>
-            <a:r>
-              <a:rPr lang="en-US" sz="1400" dirty="0">
+              <a:t>multiple_choice_questions</a:t>
+            </a:r>
+            <a:r>
+              <a:rPr lang="en-US" sz="1200" dirty="0">
                 <a:solidFill>
                   <a:schemeClr val="bg1"/>
                 </a:solidFill>
                 <a:latin typeface="Comic Sans MS" panose="030F0902030302020204" pitchFamily="66" charset="0"/>
               </a:rPr>
-              <a:t>Description</a:t>
-            </a:r>
-          </a:p>
-          <a:p>
-            <a:endParaRPr lang="en-US" sz="1400" dirty="0">
-              <a:solidFill>
-                <a:schemeClr val="bg1"/>
-              </a:solidFill>
-              <a:latin typeface="Comic Sans MS" panose="030F0902030302020204" pitchFamily="66" charset="0"/>
-            </a:endParaRPr>
-          </a:p>
-          <a:p>
-            <a:endParaRPr lang="en-US" sz="1400" dirty="0">
-              <a:solidFill>
-                <a:schemeClr val="bg1"/>
-              </a:solidFill>
-              <a:latin typeface="Comic Sans MS" panose="030F0902030302020204" pitchFamily="66" charset="0"/>
-            </a:endParaRPr>
-          </a:p>
-          <a:p>
-            <a:endParaRPr lang="en-US" sz="1400" dirty="0">
-              <a:solidFill>
-                <a:schemeClr val="bg1"/>
-              </a:solidFill>
-              <a:latin typeface="Comic Sans MS" panose="030F0902030302020204" pitchFamily="66" charset="0"/>
-            </a:endParaRPr>
-          </a:p>
-          <a:p>
-            <a:endParaRPr lang="en-US" sz="1400" dirty="0">
-              <a:solidFill>
-                <a:schemeClr val="bg1"/>
-              </a:solidFill>
-              <a:latin typeface="Comic Sans MS" panose="030F0902030302020204" pitchFamily="66" charset="0"/>
-            </a:endParaRPr>
-          </a:p>
-          <a:p>
-            <a:endParaRPr lang="en-US" sz="1400" dirty="0">
-              <a:solidFill>
-                <a:schemeClr val="bg1"/>
-              </a:solidFill>
-              <a:latin typeface="Comic Sans MS" panose="030F0902030302020204" pitchFamily="66" charset="0"/>
-            </a:endParaRPr>
-          </a:p>
-          <a:p>
-            <a:endParaRPr lang="en-US" sz="1400" dirty="0">
-              <a:solidFill>
-                <a:schemeClr val="bg1"/>
-              </a:solidFill>
-              <a:latin typeface="Comic Sans MS" panose="030F0902030302020204" pitchFamily="66" charset="0"/>
-            </a:endParaRPr>
-          </a:p>
-          <a:p>
-            <a:endParaRPr lang="en-US" sz="1400" u="sng" dirty="0">
-              <a:solidFill>
-                <a:srgbClr val="0432FF"/>
-              </a:solidFill>
-              <a:latin typeface="Comic Sans MS" panose="030F0902030302020204" pitchFamily="66" charset="0"/>
-            </a:endParaRPr>
-          </a:p>
-          <a:p>
-            <a:endParaRPr lang="en-US" sz="1400" u="sng" dirty="0">
-              <a:solidFill>
-                <a:srgbClr val="0432FF"/>
-              </a:solidFill>
-              <a:latin typeface="Comic Sans MS" panose="030F0902030302020204" pitchFamily="66" charset="0"/>
-            </a:endParaRPr>
-          </a:p>
-          <a:p>
-            <a:endParaRPr lang="en-US" sz="1400" u="sng" dirty="0">
-              <a:solidFill>
-                <a:srgbClr val="0432FF"/>
-              </a:solidFill>
-              <a:latin typeface="Comic Sans MS" panose="030F0902030302020204" pitchFamily="66" charset="0"/>
-            </a:endParaRPr>
-          </a:p>
-          <a:p>
-            <a:endParaRPr lang="en-US" sz="1400" u="sng" dirty="0">
-              <a:solidFill>
-                <a:srgbClr val="0432FF"/>
-              </a:solidFill>
-              <a:latin typeface="Comic Sans MS" panose="030F0902030302020204" pitchFamily="66" charset="0"/>
-            </a:endParaRPr>
-          </a:p>
-          <a:p>
-            <a:endParaRPr lang="en-US" sz="1400" u="sng" dirty="0">
-              <a:solidFill>
-                <a:srgbClr val="0432FF"/>
-              </a:solidFill>
-              <a:latin typeface="Comic Sans MS" panose="030F0902030302020204" pitchFamily="66" charset="0"/>
-            </a:endParaRPr>
-          </a:p>
-          <a:p>
-            <a:endParaRPr lang="en-US" sz="1400" u="sng" dirty="0">
-              <a:solidFill>
-                <a:srgbClr val="0432FF"/>
-              </a:solidFill>
-              <a:latin typeface="Comic Sans MS" panose="030F0902030302020204" pitchFamily="66" charset="0"/>
-            </a:endParaRPr>
-          </a:p>
-          <a:p>
-            <a:endParaRPr lang="en-US" sz="1400" u="sng" dirty="0">
-              <a:solidFill>
-                <a:srgbClr val="0432FF"/>
-              </a:solidFill>
-              <a:latin typeface="Comic Sans MS" panose="030F0902030302020204" pitchFamily="66" charset="0"/>
-            </a:endParaRPr>
-          </a:p>
-          <a:p>
-            <a:endParaRPr lang="en-US" sz="1400" u="sng" dirty="0">
-              <a:solidFill>
-                <a:srgbClr val="0432FF"/>
-              </a:solidFill>
-              <a:latin typeface="Comic Sans MS" panose="030F0902030302020204" pitchFamily="66" charset="0"/>
-            </a:endParaRPr>
-          </a:p>
-          <a:p>
-            <a:endParaRPr lang="en-US" sz="1400" u="sng" dirty="0">
-              <a:solidFill>
-                <a:srgbClr val="0432FF"/>
-              </a:solidFill>
-              <a:latin typeface="Comic Sans MS" panose="030F0902030302020204" pitchFamily="66" charset="0"/>
-            </a:endParaRPr>
-          </a:p>
-          <a:p>
-            <a:endParaRPr lang="en-US" sz="1400" u="sng" dirty="0">
-              <a:solidFill>
-                <a:srgbClr val="0432FF"/>
-              </a:solidFill>
-              <a:latin typeface="Comic Sans MS" panose="030F0902030302020204" pitchFamily="66" charset="0"/>
-            </a:endParaRPr>
-          </a:p>
-          <a:p>
-            <a:endParaRPr lang="en-US" sz="1400" u="sng" dirty="0">
-              <a:solidFill>
-                <a:srgbClr val="0432FF"/>
-              </a:solidFill>
-              <a:latin typeface="Comic Sans MS" panose="030F0902030302020204" pitchFamily="66" charset="0"/>
-            </a:endParaRPr>
-          </a:p>
-          <a:p>
-            <a:r>
-              <a:rPr lang="en-US" sz="1400" u="sng" dirty="0">
-                <a:solidFill>
-                  <a:srgbClr val="0432FF"/>
-                </a:solidFill>
-                <a:latin typeface="Comic Sans MS" panose="030F0902030302020204" pitchFamily="66" charset="0"/>
-              </a:rPr>
-              <a:t>Back</a:t>
+              <a:t>/1/ask</a:t>
             </a:r>
           </a:p>
         </p:txBody>
       </p:sp>
       <p:sp>
         <p:nvSpPr>
-          <p:cNvPr id="4" name="TextBox 3">
+          <p:cNvPr id="6" name="Rounded Rectangle 5">
             <a:extLst>
               <a:ext uri="{FF2B5EF4-FFF2-40B4-BE49-F238E27FC236}">
-                <a16:creationId xmlns:a16="http://schemas.microsoft.com/office/drawing/2014/main" id="{32820AB9-7CA6-8F41-A812-9F4C46331562}"/>
-              </a:ext>
-            </a:extLst>
-          </p:cNvPr>
-          <p:cNvSpPr txBox="1"/>
-          <p:nvPr/>
-        </p:nvSpPr>
-        <p:spPr>
-          <a:xfrm>
-            <a:off x="1485404" y="1945992"/>
-            <a:ext cx="4077196" cy="307777"/>
-          </a:xfrm>
-          <a:prstGeom prst="rect">
-            <a:avLst/>
-          </a:prstGeom>
-          <a:noFill/>
-          <a:ln>
-            <a:solidFill>
-              <a:schemeClr val="bg1"/>
-            </a:solidFill>
-          </a:ln>
-        </p:spPr>
-        <p:txBody>
-          <a:bodyPr wrap="square" rtlCol="0">
-            <a:spAutoFit/>
-          </a:bodyPr>
-          <a:lstStyle/>
-          <a:p>
-            <a:r>
-              <a:rPr lang="en-US" sz="1400" dirty="0">
-                <a:solidFill>
-                  <a:schemeClr val="bg1"/>
-                </a:solidFill>
-                <a:latin typeface="Comic Sans MS" panose="030F0902030302020204" pitchFamily="66" charset="0"/>
-              </a:rPr>
-              <a:t>Rails MVC</a:t>
-            </a:r>
-          </a:p>
-        </p:txBody>
-      </p:sp>
-      <p:sp>
-        <p:nvSpPr>
-          <p:cNvPr id="11" name="TextBox 10">
-            <a:extLst>
-              <a:ext uri="{FF2B5EF4-FFF2-40B4-BE49-F238E27FC236}">
-                <a16:creationId xmlns:a16="http://schemas.microsoft.com/office/drawing/2014/main" id="{5880DF0C-DDBC-A243-8BC6-846ACCD4FA07}"/>
-              </a:ext>
-            </a:extLst>
-          </p:cNvPr>
-          <p:cNvSpPr txBox="1"/>
-          <p:nvPr/>
-        </p:nvSpPr>
-        <p:spPr>
-          <a:xfrm>
-            <a:off x="1485404" y="2582635"/>
-            <a:ext cx="4077196" cy="523220"/>
-          </a:xfrm>
-          <a:prstGeom prst="rect">
-            <a:avLst/>
-          </a:prstGeom>
-          <a:noFill/>
-          <a:ln>
-            <a:solidFill>
-              <a:schemeClr val="bg1"/>
-            </a:solidFill>
-          </a:ln>
-        </p:spPr>
-        <p:txBody>
-          <a:bodyPr wrap="square" rtlCol="0">
-            <a:spAutoFit/>
-          </a:bodyPr>
-          <a:lstStyle/>
-          <a:p>
-            <a:r>
-              <a:rPr lang="en-US" sz="1400" dirty="0">
-                <a:solidFill>
-                  <a:schemeClr val="bg1"/>
-                </a:solidFill>
-                <a:latin typeface="Comic Sans MS" panose="030F0902030302020204" pitchFamily="66" charset="0"/>
-              </a:rPr>
-              <a:t>Covers concepts and common tasks in the Rails Model-View-Controller architecture.</a:t>
-            </a:r>
-          </a:p>
-        </p:txBody>
-      </p:sp>
-      <p:sp>
-        <p:nvSpPr>
-          <p:cNvPr id="5" name="Rounded Rectangle 4">
-            <a:extLst>
-              <a:ext uri="{FF2B5EF4-FFF2-40B4-BE49-F238E27FC236}">
-                <a16:creationId xmlns:a16="http://schemas.microsoft.com/office/drawing/2014/main" id="{1376ECFE-A6F2-6C42-A904-0E15AFF7920D}"/>
+                <a16:creationId xmlns:a16="http://schemas.microsoft.com/office/drawing/2014/main" id="{33F8B4D0-A25F-4D49-8616-2DBF2C9B1E3B}"/>
               </a:ext>
             </a:extLst>
           </p:cNvPr>
@@ -17410,8 +17399,8 @@
         </p:nvSpPr>
         <p:spPr>
           <a:xfrm>
-            <a:off x="1485405" y="3303185"/>
-            <a:ext cx="1054668" cy="327860"/>
+            <a:off x="1389412" y="3506781"/>
+            <a:ext cx="1544857" cy="327860"/>
           </a:xfrm>
           <a:prstGeom prst="roundRect">
             <a:avLst/>
@@ -17453,7 +17442,354 @@
                 </a:solidFill>
                 <a:latin typeface="Comic Sans MS" panose="030F0902030302020204" pitchFamily="66" charset="0"/>
               </a:rPr>
-              <a:t>Submit</a:t>
+              <a:t>Submit Answer</a:t>
+            </a:r>
+          </a:p>
+        </p:txBody>
+      </p:sp>
+      <p:sp>
+        <p:nvSpPr>
+          <p:cNvPr id="9" name="Rectangle 8">
+            <a:extLst>
+              <a:ext uri="{FF2B5EF4-FFF2-40B4-BE49-F238E27FC236}">
+                <a16:creationId xmlns:a16="http://schemas.microsoft.com/office/drawing/2014/main" id="{02AE0571-ECA9-7940-B510-0DEBB21E22C3}"/>
+              </a:ext>
+            </a:extLst>
+          </p:cNvPr>
+          <p:cNvSpPr/>
+          <p:nvPr/>
+        </p:nvSpPr>
+        <p:spPr>
+          <a:xfrm>
+            <a:off x="1175657" y="870277"/>
+            <a:ext cx="9832769" cy="344384"/>
+          </a:xfrm>
+          <a:prstGeom prst="rect">
+            <a:avLst/>
+          </a:prstGeom>
+          <a:solidFill>
+            <a:schemeClr val="bg1"/>
+          </a:solidFill>
+          <a:ln>
+            <a:noFill/>
+          </a:ln>
+        </p:spPr>
+        <p:style>
+          <a:lnRef idx="2">
+            <a:schemeClr val="accent1">
+              <a:shade val="50000"/>
+            </a:schemeClr>
+          </a:lnRef>
+          <a:fillRef idx="1">
+            <a:schemeClr val="accent1"/>
+          </a:fillRef>
+          <a:effectRef idx="0">
+            <a:schemeClr val="accent1"/>
+          </a:effectRef>
+          <a:fontRef idx="minor">
+            <a:schemeClr val="lt1"/>
+          </a:fontRef>
+        </p:style>
+        <p:txBody>
+          <a:bodyPr rtlCol="0" anchor="ctr"/>
+          <a:lstStyle/>
+          <a:p>
+            <a:r>
+              <a:rPr lang="en-US" sz="1400" dirty="0">
+                <a:solidFill>
+                  <a:schemeClr val="tx1"/>
+                </a:solidFill>
+                <a:latin typeface="Comic Sans MS" panose="030F0902030302020204" pitchFamily="66" charset="0"/>
+              </a:rPr>
+              <a:t>Wapp  Home  About</a:t>
+            </a:r>
+          </a:p>
+        </p:txBody>
+      </p:sp>
+    </p:spTree>
+    <p:extLst>
+      <p:ext uri="{BB962C8B-B14F-4D97-AF65-F5344CB8AC3E}">
+        <p14:creationId xmlns:p14="http://schemas.microsoft.com/office/powerpoint/2010/main" val="2382681040"/>
+      </p:ext>
+    </p:extLst>
+  </p:cSld>
+  <p:clrMapOvr>
+    <a:masterClrMapping/>
+  </p:clrMapOvr>
+</p:sld>
+</file>
+
+<file path=ppt/slides/slide30.xml><?xml version="1.0" encoding="utf-8"?>
+<p:sld xmlns:a="http://schemas.openxmlformats.org/drawingml/2006/main" xmlns:r="http://schemas.openxmlformats.org/officeDocument/2006/relationships" xmlns:p="http://schemas.openxmlformats.org/presentationml/2006/main">
+  <p:cSld>
+    <p:spTree>
+      <p:nvGrpSpPr>
+        <p:cNvPr id="1" name=""/>
+        <p:cNvGrpSpPr/>
+        <p:nvPr/>
+      </p:nvGrpSpPr>
+      <p:grpSpPr>
+        <a:xfrm>
+          <a:off x="0" y="0"/>
+          <a:ext cx="0" cy="0"/>
+          <a:chOff x="0" y="0"/>
+          <a:chExt cx="0" cy="0"/>
+        </a:xfrm>
+      </p:grpSpPr>
+      <p:sp>
+        <p:nvSpPr>
+          <p:cNvPr id="7" name="TextBox 6">
+            <a:extLst>
+              <a:ext uri="{FF2B5EF4-FFF2-40B4-BE49-F238E27FC236}">
+                <a16:creationId xmlns:a16="http://schemas.microsoft.com/office/drawing/2014/main" id="{F3573DF9-457D-7948-8B22-DB5337292FA7}"/>
+              </a:ext>
+            </a:extLst>
+          </p:cNvPr>
+          <p:cNvSpPr txBox="1"/>
+          <p:nvPr/>
+        </p:nvSpPr>
+        <p:spPr>
+          <a:xfrm>
+            <a:off x="1784068" y="292529"/>
+            <a:ext cx="873957" cy="276999"/>
+          </a:xfrm>
+          <a:prstGeom prst="rect">
+            <a:avLst/>
+          </a:prstGeom>
+          <a:noFill/>
+        </p:spPr>
+        <p:txBody>
+          <a:bodyPr wrap="none" rtlCol="0">
+            <a:spAutoFit/>
+          </a:bodyPr>
+          <a:lstStyle/>
+          <a:p>
+            <a:r>
+              <a:rPr lang="en-US" sz="1200" dirty="0">
+                <a:solidFill>
+                  <a:schemeClr val="bg1"/>
+                </a:solidFill>
+                <a:latin typeface="Comic Sans MS" panose="030F0902030302020204" pitchFamily="66" charset="0"/>
+              </a:rPr>
+              <a:t>Edit Quiz</a:t>
+            </a:r>
+          </a:p>
+        </p:txBody>
+      </p:sp>
+      <p:sp>
+        <p:nvSpPr>
+          <p:cNvPr id="8" name="TextBox 7">
+            <a:extLst>
+              <a:ext uri="{FF2B5EF4-FFF2-40B4-BE49-F238E27FC236}">
+                <a16:creationId xmlns:a16="http://schemas.microsoft.com/office/drawing/2014/main" id="{49DF0299-C639-944C-9F0E-91BE71AC7E52}"/>
+              </a:ext>
+            </a:extLst>
+          </p:cNvPr>
+          <p:cNvSpPr txBox="1"/>
+          <p:nvPr/>
+        </p:nvSpPr>
+        <p:spPr>
+          <a:xfrm>
+            <a:off x="2233351" y="581403"/>
+            <a:ext cx="2598788" cy="276999"/>
+          </a:xfrm>
+          <a:prstGeom prst="rect">
+            <a:avLst/>
+          </a:prstGeom>
+          <a:noFill/>
+        </p:spPr>
+        <p:txBody>
+          <a:bodyPr wrap="none" rtlCol="0">
+            <a:spAutoFit/>
+          </a:bodyPr>
+          <a:lstStyle/>
+          <a:p>
+            <a:r>
+              <a:rPr lang="en-US" sz="1200" dirty="0">
+                <a:solidFill>
+                  <a:schemeClr val="bg1"/>
+                </a:solidFill>
+                <a:latin typeface="Comic Sans MS" panose="030F0902030302020204" pitchFamily="66" charset="0"/>
+              </a:rPr>
+              <a:t>http://localhost:3000/quizzes/1</a:t>
+            </a:r>
+          </a:p>
+        </p:txBody>
+      </p:sp>
+      <p:sp>
+        <p:nvSpPr>
+          <p:cNvPr id="10" name="TextBox 9">
+            <a:extLst>
+              <a:ext uri="{FF2B5EF4-FFF2-40B4-BE49-F238E27FC236}">
+                <a16:creationId xmlns:a16="http://schemas.microsoft.com/office/drawing/2014/main" id="{C8E10E37-1019-8D4C-BA6F-9A6E9CF0D317}"/>
+              </a:ext>
+            </a:extLst>
+          </p:cNvPr>
+          <p:cNvSpPr txBox="1"/>
+          <p:nvPr/>
+        </p:nvSpPr>
+        <p:spPr>
+          <a:xfrm>
+            <a:off x="1390398" y="1348783"/>
+            <a:ext cx="8706102" cy="2893100"/>
+          </a:xfrm>
+          <a:prstGeom prst="rect">
+            <a:avLst/>
+          </a:prstGeom>
+          <a:noFill/>
+        </p:spPr>
+        <p:txBody>
+          <a:bodyPr wrap="square" rtlCol="0">
+            <a:spAutoFit/>
+          </a:bodyPr>
+          <a:lstStyle/>
+          <a:p>
+            <a:r>
+              <a:rPr lang="en-US" sz="1400" b="1" dirty="0">
+                <a:solidFill>
+                  <a:schemeClr val="bg1"/>
+                </a:solidFill>
+                <a:latin typeface="Comic Sans MS" panose="030F0902030302020204" pitchFamily="66" charset="0"/>
+              </a:rPr>
+              <a:t>Title:</a:t>
+            </a:r>
+            <a:r>
+              <a:rPr lang="en-US" sz="1400" dirty="0">
+                <a:solidFill>
+                  <a:schemeClr val="bg1"/>
+                </a:solidFill>
+                <a:latin typeface="Comic Sans MS" panose="030F0902030302020204" pitchFamily="66" charset="0"/>
+              </a:rPr>
+              <a:t> Rails MVC</a:t>
+            </a:r>
+          </a:p>
+          <a:p>
+            <a:endParaRPr lang="en-US" sz="1400" dirty="0">
+              <a:solidFill>
+                <a:schemeClr val="bg1"/>
+              </a:solidFill>
+              <a:latin typeface="Comic Sans MS" panose="030F0902030302020204" pitchFamily="66" charset="0"/>
+            </a:endParaRPr>
+          </a:p>
+          <a:p>
+            <a:r>
+              <a:rPr lang="en-US" sz="1400" b="1" dirty="0">
+                <a:solidFill>
+                  <a:schemeClr val="bg1"/>
+                </a:solidFill>
+                <a:latin typeface="Comic Sans MS" panose="030F0902030302020204" pitchFamily="66" charset="0"/>
+              </a:rPr>
+              <a:t>Description:</a:t>
+            </a:r>
+            <a:r>
+              <a:rPr lang="en-US" sz="1400" dirty="0">
+                <a:solidFill>
+                  <a:schemeClr val="bg1"/>
+                </a:solidFill>
+                <a:latin typeface="Comic Sans MS" panose="030F0902030302020204" pitchFamily="66" charset="0"/>
+              </a:rPr>
+              <a:t> Covers concepts and common tasks in the Rails Model-View-Controller architecture. </a:t>
+            </a:r>
+          </a:p>
+          <a:p>
+            <a:endParaRPr lang="en-US" sz="1400" dirty="0">
+              <a:solidFill>
+                <a:schemeClr val="bg1"/>
+              </a:solidFill>
+              <a:latin typeface="Comic Sans MS" panose="030F0902030302020204" pitchFamily="66" charset="0"/>
+            </a:endParaRPr>
+          </a:p>
+          <a:p>
+            <a:endParaRPr lang="en-US" sz="1400" dirty="0">
+              <a:solidFill>
+                <a:schemeClr val="bg1"/>
+              </a:solidFill>
+              <a:latin typeface="Comic Sans MS" panose="030F0902030302020204" pitchFamily="66" charset="0"/>
+            </a:endParaRPr>
+          </a:p>
+          <a:p>
+            <a:endParaRPr lang="en-US" sz="1400" dirty="0">
+              <a:solidFill>
+                <a:schemeClr val="bg1"/>
+              </a:solidFill>
+              <a:latin typeface="Comic Sans MS" panose="030F0902030302020204" pitchFamily="66" charset="0"/>
+            </a:endParaRPr>
+          </a:p>
+          <a:p>
+            <a:endParaRPr lang="en-US" sz="1400" dirty="0">
+              <a:solidFill>
+                <a:schemeClr val="bg1"/>
+              </a:solidFill>
+              <a:latin typeface="Comic Sans MS" panose="030F0902030302020204" pitchFamily="66" charset="0"/>
+            </a:endParaRPr>
+          </a:p>
+          <a:p>
+            <a:endParaRPr lang="en-US" sz="1400" dirty="0">
+              <a:solidFill>
+                <a:schemeClr val="bg1"/>
+              </a:solidFill>
+              <a:latin typeface="Comic Sans MS" panose="030F0902030302020204" pitchFamily="66" charset="0"/>
+            </a:endParaRPr>
+          </a:p>
+          <a:p>
+            <a:endParaRPr lang="en-US" sz="1400" dirty="0">
+              <a:solidFill>
+                <a:schemeClr val="bg1"/>
+              </a:solidFill>
+              <a:latin typeface="Comic Sans MS" panose="030F0902030302020204" pitchFamily="66" charset="0"/>
+            </a:endParaRPr>
+          </a:p>
+          <a:p>
+            <a:endParaRPr lang="en-US" sz="1400" u="sng" dirty="0">
+              <a:solidFill>
+                <a:srgbClr val="0432FF"/>
+              </a:solidFill>
+              <a:latin typeface="Comic Sans MS" panose="030F0902030302020204" pitchFamily="66" charset="0"/>
+            </a:endParaRPr>
+          </a:p>
+          <a:p>
+            <a:endParaRPr lang="en-US" sz="1400" u="sng" dirty="0">
+              <a:solidFill>
+                <a:srgbClr val="0432FF"/>
+              </a:solidFill>
+              <a:latin typeface="Comic Sans MS" panose="030F0902030302020204" pitchFamily="66" charset="0"/>
+            </a:endParaRPr>
+          </a:p>
+          <a:p>
+            <a:endParaRPr lang="en-US" sz="1400" u="sng" dirty="0">
+              <a:solidFill>
+                <a:srgbClr val="0432FF"/>
+              </a:solidFill>
+              <a:latin typeface="Comic Sans MS" panose="030F0902030302020204" pitchFamily="66" charset="0"/>
+            </a:endParaRPr>
+          </a:p>
+          <a:p>
+            <a:r>
+              <a:rPr lang="en-US" sz="1400" u="sng" dirty="0">
+                <a:solidFill>
+                  <a:srgbClr val="0432FF"/>
+                </a:solidFill>
+                <a:latin typeface="Comic Sans MS" panose="030F0902030302020204" pitchFamily="66" charset="0"/>
+              </a:rPr>
+              <a:t>Edit</a:t>
+            </a:r>
+            <a:r>
+              <a:rPr lang="en-US" sz="1400" dirty="0">
+                <a:solidFill>
+                  <a:schemeClr val="bg1"/>
+                </a:solidFill>
+                <a:latin typeface="Comic Sans MS" panose="030F0902030302020204" pitchFamily="66" charset="0"/>
+              </a:rPr>
+              <a:t> | </a:t>
+            </a:r>
+            <a:r>
+              <a:rPr lang="en-US" sz="1400" u="sng" dirty="0">
+                <a:solidFill>
+                  <a:srgbClr val="0432FF"/>
+                </a:solidFill>
+                <a:latin typeface="Comic Sans MS" panose="030F0902030302020204" pitchFamily="66" charset="0"/>
+              </a:rPr>
+              <a:t>Back</a:t>
             </a:r>
           </a:p>
         </p:txBody>
@@ -17532,13 +17868,2038 @@
           <p:nvPr>
             <p:extLst>
               <p:ext uri="{D42A27DB-BD31-4B8C-83A1-F6EECF244321}">
-                <p14:modId xmlns:p14="http://schemas.microsoft.com/office/powerpoint/2010/main" val="4168346161"/>
+                <p14:modId xmlns:p14="http://schemas.microsoft.com/office/powerpoint/2010/main" val="3972834920"/>
               </p:ext>
             </p:extLst>
           </p:nvPr>
         </p:nvGraphicFramePr>
         <p:xfrm>
-          <a:off x="1389412" y="3879618"/>
+          <a:off x="1389412" y="2254018"/>
+          <a:ext cx="9380188" cy="1483360"/>
+        </p:xfrm>
+        <a:graphic>
+          <a:graphicData uri="http://schemas.openxmlformats.org/drawingml/2006/table">
+            <a:tbl>
+              <a:tblPr firstRow="1" bandRow="1">
+                <a:tableStyleId>{5C22544A-7EE6-4342-B048-85BDC9FD1C3A}</a:tableStyleId>
+              </a:tblPr>
+              <a:tblGrid>
+                <a:gridCol w="2839688">
+                  <a:extLst>
+                    <a:ext uri="{9D8B030D-6E8A-4147-A177-3AD203B41FA5}">
+                      <a16:colId xmlns:a16="http://schemas.microsoft.com/office/drawing/2014/main" val="2612485621"/>
+                    </a:ext>
+                  </a:extLst>
+                </a:gridCol>
+                <a:gridCol w="1308100">
+                  <a:extLst>
+                    <a:ext uri="{9D8B030D-6E8A-4147-A177-3AD203B41FA5}">
+                      <a16:colId xmlns:a16="http://schemas.microsoft.com/office/drawing/2014/main" val="2603060939"/>
+                    </a:ext>
+                  </a:extLst>
+                </a:gridCol>
+                <a:gridCol w="1308100">
+                  <a:extLst>
+                    <a:ext uri="{9D8B030D-6E8A-4147-A177-3AD203B41FA5}">
+                      <a16:colId xmlns:a16="http://schemas.microsoft.com/office/drawing/2014/main" val="2013560310"/>
+                    </a:ext>
+                  </a:extLst>
+                </a:gridCol>
+                <a:gridCol w="1308100">
+                  <a:extLst>
+                    <a:ext uri="{9D8B030D-6E8A-4147-A177-3AD203B41FA5}">
+                      <a16:colId xmlns:a16="http://schemas.microsoft.com/office/drawing/2014/main" val="133258097"/>
+                    </a:ext>
+                  </a:extLst>
+                </a:gridCol>
+                <a:gridCol w="1308100">
+                  <a:extLst>
+                    <a:ext uri="{9D8B030D-6E8A-4147-A177-3AD203B41FA5}">
+                      <a16:colId xmlns:a16="http://schemas.microsoft.com/office/drawing/2014/main" val="274706273"/>
+                    </a:ext>
+                  </a:extLst>
+                </a:gridCol>
+                <a:gridCol w="1308100">
+                  <a:extLst>
+                    <a:ext uri="{9D8B030D-6E8A-4147-A177-3AD203B41FA5}">
+                      <a16:colId xmlns:a16="http://schemas.microsoft.com/office/drawing/2014/main" val="2461746846"/>
+                    </a:ext>
+                  </a:extLst>
+                </a:gridCol>
+              </a:tblGrid>
+              <a:tr h="370840">
+                <a:tc>
+                  <a:txBody>
+                    <a:bodyPr/>
+                    <a:lstStyle/>
+                    <a:p>
+                      <a:r>
+                        <a:rPr lang="en-US" sz="1200" dirty="0">
+                          <a:solidFill>
+                            <a:schemeClr val="bg1"/>
+                          </a:solidFill>
+                          <a:latin typeface="Comic Sans MS" panose="030F0902030302020204" pitchFamily="66" charset="0"/>
+                        </a:rPr>
+                        <a:t>Question</a:t>
+                      </a:r>
+                    </a:p>
+                  </a:txBody>
+                  <a:tcPr>
+                    <a:lnL w="12700" cap="flat" cmpd="sng" algn="ctr">
+                      <a:solidFill>
+                        <a:schemeClr val="bg1"/>
+                      </a:solidFill>
+                      <a:prstDash val="solid"/>
+                      <a:round/>
+                      <a:headEnd type="none" w="med" len="med"/>
+                      <a:tailEnd type="none" w="med" len="med"/>
+                    </a:lnL>
+                    <a:lnR w="12700" cap="flat" cmpd="sng" algn="ctr">
+                      <a:solidFill>
+                        <a:schemeClr val="bg1"/>
+                      </a:solidFill>
+                      <a:prstDash val="solid"/>
+                      <a:round/>
+                      <a:headEnd type="none" w="med" len="med"/>
+                      <a:tailEnd type="none" w="med" len="med"/>
+                    </a:lnR>
+                    <a:lnT w="12700" cap="flat" cmpd="sng" algn="ctr">
+                      <a:solidFill>
+                        <a:schemeClr val="bg1"/>
+                      </a:solidFill>
+                      <a:prstDash val="solid"/>
+                      <a:round/>
+                      <a:headEnd type="none" w="med" len="med"/>
+                      <a:tailEnd type="none" w="med" len="med"/>
+                    </a:lnT>
+                    <a:lnB w="12700" cap="flat" cmpd="sng" algn="ctr">
+                      <a:solidFill>
+                        <a:schemeClr val="bg1"/>
+                      </a:solidFill>
+                      <a:prstDash val="solid"/>
+                      <a:round/>
+                      <a:headEnd type="none" w="med" len="med"/>
+                      <a:tailEnd type="none" w="med" len="med"/>
+                    </a:lnB>
+                    <a:noFill/>
+                  </a:tcPr>
+                </a:tc>
+                <a:tc>
+                  <a:txBody>
+                    <a:bodyPr/>
+                    <a:lstStyle/>
+                    <a:p>
+                      <a:r>
+                        <a:rPr lang="en-US" sz="1200" dirty="0">
+                          <a:solidFill>
+                            <a:schemeClr val="bg1"/>
+                          </a:solidFill>
+                          <a:latin typeface="Comic Sans MS" panose="030F0902030302020204" pitchFamily="66" charset="0"/>
+                        </a:rPr>
+                        <a:t>Answer</a:t>
+                      </a:r>
+                    </a:p>
+                  </a:txBody>
+                  <a:tcPr>
+                    <a:lnL w="12700" cap="flat" cmpd="sng" algn="ctr">
+                      <a:solidFill>
+                        <a:schemeClr val="bg1"/>
+                      </a:solidFill>
+                      <a:prstDash val="solid"/>
+                      <a:round/>
+                      <a:headEnd type="none" w="med" len="med"/>
+                      <a:tailEnd type="none" w="med" len="med"/>
+                    </a:lnL>
+                    <a:lnR w="12700" cap="flat" cmpd="sng" algn="ctr">
+                      <a:solidFill>
+                        <a:schemeClr val="bg1"/>
+                      </a:solidFill>
+                      <a:prstDash val="solid"/>
+                      <a:round/>
+                      <a:headEnd type="none" w="med" len="med"/>
+                      <a:tailEnd type="none" w="med" len="med"/>
+                    </a:lnR>
+                    <a:lnT w="12700" cap="flat" cmpd="sng" algn="ctr">
+                      <a:solidFill>
+                        <a:schemeClr val="bg1"/>
+                      </a:solidFill>
+                      <a:prstDash val="solid"/>
+                      <a:round/>
+                      <a:headEnd type="none" w="med" len="med"/>
+                      <a:tailEnd type="none" w="med" len="med"/>
+                    </a:lnT>
+                    <a:lnB w="12700" cap="flat" cmpd="sng" algn="ctr">
+                      <a:solidFill>
+                        <a:schemeClr val="bg1"/>
+                      </a:solidFill>
+                      <a:prstDash val="solid"/>
+                      <a:round/>
+                      <a:headEnd type="none" w="med" len="med"/>
+                      <a:tailEnd type="none" w="med" len="med"/>
+                    </a:lnB>
+                    <a:noFill/>
+                  </a:tcPr>
+                </a:tc>
+                <a:tc>
+                  <a:txBody>
+                    <a:bodyPr/>
+                    <a:lstStyle/>
+                    <a:p>
+                      <a:r>
+                        <a:rPr lang="en-US" sz="1200" dirty="0">
+                          <a:solidFill>
+                            <a:schemeClr val="bg1"/>
+                          </a:solidFill>
+                          <a:latin typeface="Comic Sans MS" panose="030F0902030302020204" pitchFamily="66" charset="0"/>
+                        </a:rPr>
+                        <a:t>Distractor 1</a:t>
+                      </a:r>
+                    </a:p>
+                  </a:txBody>
+                  <a:tcPr>
+                    <a:lnL w="12700" cap="flat" cmpd="sng" algn="ctr">
+                      <a:solidFill>
+                        <a:schemeClr val="bg1"/>
+                      </a:solidFill>
+                      <a:prstDash val="solid"/>
+                      <a:round/>
+                      <a:headEnd type="none" w="med" len="med"/>
+                      <a:tailEnd type="none" w="med" len="med"/>
+                    </a:lnL>
+                    <a:lnR w="12700" cap="flat" cmpd="sng" algn="ctr">
+                      <a:solidFill>
+                        <a:schemeClr val="bg1"/>
+                      </a:solidFill>
+                      <a:prstDash val="solid"/>
+                      <a:round/>
+                      <a:headEnd type="none" w="med" len="med"/>
+                      <a:tailEnd type="none" w="med" len="med"/>
+                    </a:lnR>
+                    <a:lnT w="12700" cap="flat" cmpd="sng" algn="ctr">
+                      <a:solidFill>
+                        <a:schemeClr val="bg1"/>
+                      </a:solidFill>
+                      <a:prstDash val="solid"/>
+                      <a:round/>
+                      <a:headEnd type="none" w="med" len="med"/>
+                      <a:tailEnd type="none" w="med" len="med"/>
+                    </a:lnT>
+                    <a:lnB w="12700" cap="flat" cmpd="sng" algn="ctr">
+                      <a:solidFill>
+                        <a:schemeClr val="bg1"/>
+                      </a:solidFill>
+                      <a:prstDash val="solid"/>
+                      <a:round/>
+                      <a:headEnd type="none" w="med" len="med"/>
+                      <a:tailEnd type="none" w="med" len="med"/>
+                    </a:lnB>
+                    <a:noFill/>
+                  </a:tcPr>
+                </a:tc>
+                <a:tc>
+                  <a:txBody>
+                    <a:bodyPr/>
+                    <a:lstStyle/>
+                    <a:p>
+                      <a:r>
+                        <a:rPr lang="en-US" sz="1200" dirty="0">
+                          <a:solidFill>
+                            <a:schemeClr val="bg1"/>
+                          </a:solidFill>
+                          <a:latin typeface="Comic Sans MS" panose="030F0902030302020204" pitchFamily="66" charset="0"/>
+                        </a:rPr>
+                        <a:t>Distractor 2</a:t>
+                      </a:r>
+                    </a:p>
+                  </a:txBody>
+                  <a:tcPr>
+                    <a:lnL w="12700" cap="flat" cmpd="sng" algn="ctr">
+                      <a:solidFill>
+                        <a:schemeClr val="bg1"/>
+                      </a:solidFill>
+                      <a:prstDash val="solid"/>
+                      <a:round/>
+                      <a:headEnd type="none" w="med" len="med"/>
+                      <a:tailEnd type="none" w="med" len="med"/>
+                    </a:lnL>
+                    <a:lnR w="12700" cap="flat" cmpd="sng" algn="ctr">
+                      <a:solidFill>
+                        <a:schemeClr val="bg1"/>
+                      </a:solidFill>
+                      <a:prstDash val="solid"/>
+                      <a:round/>
+                      <a:headEnd type="none" w="med" len="med"/>
+                      <a:tailEnd type="none" w="med" len="med"/>
+                    </a:lnR>
+                    <a:lnT w="12700" cap="flat" cmpd="sng" algn="ctr">
+                      <a:solidFill>
+                        <a:schemeClr val="bg1"/>
+                      </a:solidFill>
+                      <a:prstDash val="solid"/>
+                      <a:round/>
+                      <a:headEnd type="none" w="med" len="med"/>
+                      <a:tailEnd type="none" w="med" len="med"/>
+                    </a:lnT>
+                    <a:lnB w="12700" cap="flat" cmpd="sng" algn="ctr">
+                      <a:solidFill>
+                        <a:schemeClr val="bg1"/>
+                      </a:solidFill>
+                      <a:prstDash val="solid"/>
+                      <a:round/>
+                      <a:headEnd type="none" w="med" len="med"/>
+                      <a:tailEnd type="none" w="med" len="med"/>
+                    </a:lnB>
+                    <a:noFill/>
+                  </a:tcPr>
+                </a:tc>
+                <a:tc>
+                  <a:txBody>
+                    <a:bodyPr/>
+                    <a:lstStyle/>
+                    <a:p>
+                      <a:r>
+                        <a:rPr lang="en-US" sz="1200" dirty="0">
+                          <a:solidFill>
+                            <a:schemeClr val="bg1"/>
+                          </a:solidFill>
+                          <a:latin typeface="Comic Sans MS" panose="030F0902030302020204" pitchFamily="66" charset="0"/>
+                        </a:rPr>
+                        <a:t>Distractor 3</a:t>
+                      </a:r>
+                    </a:p>
+                  </a:txBody>
+                  <a:tcPr>
+                    <a:lnL w="12700" cap="flat" cmpd="sng" algn="ctr">
+                      <a:solidFill>
+                        <a:schemeClr val="bg1"/>
+                      </a:solidFill>
+                      <a:prstDash val="solid"/>
+                      <a:round/>
+                      <a:headEnd type="none" w="med" len="med"/>
+                      <a:tailEnd type="none" w="med" len="med"/>
+                    </a:lnL>
+                    <a:lnR w="12700" cap="flat" cmpd="sng" algn="ctr">
+                      <a:solidFill>
+                        <a:schemeClr val="bg1"/>
+                      </a:solidFill>
+                      <a:prstDash val="solid"/>
+                      <a:round/>
+                      <a:headEnd type="none" w="med" len="med"/>
+                      <a:tailEnd type="none" w="med" len="med"/>
+                    </a:lnR>
+                    <a:lnT w="12700" cap="flat" cmpd="sng" algn="ctr">
+                      <a:solidFill>
+                        <a:schemeClr val="bg1"/>
+                      </a:solidFill>
+                      <a:prstDash val="solid"/>
+                      <a:round/>
+                      <a:headEnd type="none" w="med" len="med"/>
+                      <a:tailEnd type="none" w="med" len="med"/>
+                    </a:lnT>
+                    <a:lnB w="12700" cap="flat" cmpd="sng" algn="ctr">
+                      <a:solidFill>
+                        <a:schemeClr val="bg1"/>
+                      </a:solidFill>
+                      <a:prstDash val="solid"/>
+                      <a:round/>
+                      <a:headEnd type="none" w="med" len="med"/>
+                      <a:tailEnd type="none" w="med" len="med"/>
+                    </a:lnB>
+                    <a:noFill/>
+                  </a:tcPr>
+                </a:tc>
+                <a:tc>
+                  <a:txBody>
+                    <a:bodyPr/>
+                    <a:lstStyle/>
+                    <a:p>
+                      <a:r>
+                        <a:rPr lang="en-US" sz="1200" dirty="0">
+                          <a:solidFill>
+                            <a:schemeClr val="bg1"/>
+                          </a:solidFill>
+                          <a:latin typeface="Comic Sans MS" panose="030F0902030302020204" pitchFamily="66" charset="0"/>
+                        </a:rPr>
+                        <a:t>Distractor 4</a:t>
+                      </a:r>
+                    </a:p>
+                  </a:txBody>
+                  <a:tcPr>
+                    <a:lnL w="12700" cap="flat" cmpd="sng" algn="ctr">
+                      <a:solidFill>
+                        <a:schemeClr val="bg1"/>
+                      </a:solidFill>
+                      <a:prstDash val="solid"/>
+                      <a:round/>
+                      <a:headEnd type="none" w="med" len="med"/>
+                      <a:tailEnd type="none" w="med" len="med"/>
+                    </a:lnL>
+                    <a:lnR w="12700" cap="flat" cmpd="sng" algn="ctr">
+                      <a:solidFill>
+                        <a:schemeClr val="bg1"/>
+                      </a:solidFill>
+                      <a:prstDash val="solid"/>
+                      <a:round/>
+                      <a:headEnd type="none" w="med" len="med"/>
+                      <a:tailEnd type="none" w="med" len="med"/>
+                    </a:lnR>
+                    <a:lnT w="12700" cap="flat" cmpd="sng" algn="ctr">
+                      <a:solidFill>
+                        <a:schemeClr val="bg1"/>
+                      </a:solidFill>
+                      <a:prstDash val="solid"/>
+                      <a:round/>
+                      <a:headEnd type="none" w="med" len="med"/>
+                      <a:tailEnd type="none" w="med" len="med"/>
+                    </a:lnT>
+                    <a:lnB w="12700" cap="flat" cmpd="sng" algn="ctr">
+                      <a:solidFill>
+                        <a:schemeClr val="bg1"/>
+                      </a:solidFill>
+                      <a:prstDash val="solid"/>
+                      <a:round/>
+                      <a:headEnd type="none" w="med" len="med"/>
+                      <a:tailEnd type="none" w="med" len="med"/>
+                    </a:lnB>
+                    <a:noFill/>
+                  </a:tcPr>
+                </a:tc>
+                <a:extLst>
+                  <a:ext uri="{0D108BD9-81ED-4DB2-BD59-A6C34878D82A}">
+                    <a16:rowId xmlns:a16="http://schemas.microsoft.com/office/drawing/2014/main" val="1669212810"/>
+                  </a:ext>
+                </a:extLst>
+              </a:tr>
+              <a:tr h="370840">
+                <a:tc>
+                  <a:txBody>
+                    <a:bodyPr/>
+                    <a:lstStyle/>
+                    <a:p>
+                      <a:r>
+                        <a:rPr lang="en-US" sz="1200" dirty="0">
+                          <a:solidFill>
+                            <a:schemeClr val="bg1"/>
+                          </a:solidFill>
+                          <a:latin typeface="Comic Sans MS" panose="030F0902030302020204" pitchFamily="66" charset="0"/>
+                        </a:rPr>
+                        <a:t>What does the M in MVC stand for?</a:t>
+                      </a:r>
+                    </a:p>
+                  </a:txBody>
+                  <a:tcPr>
+                    <a:lnL w="12700" cap="flat" cmpd="sng" algn="ctr">
+                      <a:solidFill>
+                        <a:schemeClr val="bg1"/>
+                      </a:solidFill>
+                      <a:prstDash val="solid"/>
+                      <a:round/>
+                      <a:headEnd type="none" w="med" len="med"/>
+                      <a:tailEnd type="none" w="med" len="med"/>
+                    </a:lnL>
+                    <a:lnR w="12700" cap="flat" cmpd="sng" algn="ctr">
+                      <a:solidFill>
+                        <a:schemeClr val="bg1"/>
+                      </a:solidFill>
+                      <a:prstDash val="solid"/>
+                      <a:round/>
+                      <a:headEnd type="none" w="med" len="med"/>
+                      <a:tailEnd type="none" w="med" len="med"/>
+                    </a:lnR>
+                    <a:lnT w="12700" cap="flat" cmpd="sng" algn="ctr">
+                      <a:solidFill>
+                        <a:schemeClr val="bg1"/>
+                      </a:solidFill>
+                      <a:prstDash val="solid"/>
+                      <a:round/>
+                      <a:headEnd type="none" w="med" len="med"/>
+                      <a:tailEnd type="none" w="med" len="med"/>
+                    </a:lnT>
+                    <a:lnB w="12700" cap="flat" cmpd="sng" algn="ctr">
+                      <a:solidFill>
+                        <a:schemeClr val="bg1"/>
+                      </a:solidFill>
+                      <a:prstDash val="solid"/>
+                      <a:round/>
+                      <a:headEnd type="none" w="med" len="med"/>
+                      <a:tailEnd type="none" w="med" len="med"/>
+                    </a:lnB>
+                    <a:noFill/>
+                  </a:tcPr>
+                </a:tc>
+                <a:tc>
+                  <a:txBody>
+                    <a:bodyPr/>
+                    <a:lstStyle/>
+                    <a:p>
+                      <a:r>
+                        <a:rPr lang="en-US" sz="1200" dirty="0">
+                          <a:solidFill>
+                            <a:schemeClr val="bg1"/>
+                          </a:solidFill>
+                          <a:latin typeface="Comic Sans MS" panose="030F0902030302020204" pitchFamily="66" charset="0"/>
+                        </a:rPr>
+                        <a:t>Model</a:t>
+                      </a:r>
+                    </a:p>
+                  </a:txBody>
+                  <a:tcPr>
+                    <a:lnL w="12700" cap="flat" cmpd="sng" algn="ctr">
+                      <a:solidFill>
+                        <a:schemeClr val="bg1"/>
+                      </a:solidFill>
+                      <a:prstDash val="solid"/>
+                      <a:round/>
+                      <a:headEnd type="none" w="med" len="med"/>
+                      <a:tailEnd type="none" w="med" len="med"/>
+                    </a:lnL>
+                    <a:lnR w="12700" cap="flat" cmpd="sng" algn="ctr">
+                      <a:solidFill>
+                        <a:schemeClr val="bg1"/>
+                      </a:solidFill>
+                      <a:prstDash val="solid"/>
+                      <a:round/>
+                      <a:headEnd type="none" w="med" len="med"/>
+                      <a:tailEnd type="none" w="med" len="med"/>
+                    </a:lnR>
+                    <a:lnT w="12700" cap="flat" cmpd="sng" algn="ctr">
+                      <a:solidFill>
+                        <a:schemeClr val="bg1"/>
+                      </a:solidFill>
+                      <a:prstDash val="solid"/>
+                      <a:round/>
+                      <a:headEnd type="none" w="med" len="med"/>
+                      <a:tailEnd type="none" w="med" len="med"/>
+                    </a:lnT>
+                    <a:lnB w="12700" cap="flat" cmpd="sng" algn="ctr">
+                      <a:solidFill>
+                        <a:schemeClr val="bg1"/>
+                      </a:solidFill>
+                      <a:prstDash val="solid"/>
+                      <a:round/>
+                      <a:headEnd type="none" w="med" len="med"/>
+                      <a:tailEnd type="none" w="med" len="med"/>
+                    </a:lnB>
+                    <a:noFill/>
+                  </a:tcPr>
+                </a:tc>
+                <a:tc>
+                  <a:txBody>
+                    <a:bodyPr/>
+                    <a:lstStyle/>
+                    <a:p>
+                      <a:r>
+                        <a:rPr lang="en-US" sz="1200" dirty="0">
+                          <a:solidFill>
+                            <a:schemeClr val="bg1"/>
+                          </a:solidFill>
+                          <a:latin typeface="Comic Sans MS" panose="030F0902030302020204" pitchFamily="66" charset="0"/>
+                        </a:rPr>
+                        <a:t>Main</a:t>
+                      </a:r>
+                    </a:p>
+                  </a:txBody>
+                  <a:tcPr>
+                    <a:lnL w="12700" cap="flat" cmpd="sng" algn="ctr">
+                      <a:solidFill>
+                        <a:schemeClr val="bg1"/>
+                      </a:solidFill>
+                      <a:prstDash val="solid"/>
+                      <a:round/>
+                      <a:headEnd type="none" w="med" len="med"/>
+                      <a:tailEnd type="none" w="med" len="med"/>
+                    </a:lnL>
+                    <a:lnR w="12700" cap="flat" cmpd="sng" algn="ctr">
+                      <a:solidFill>
+                        <a:schemeClr val="bg1"/>
+                      </a:solidFill>
+                      <a:prstDash val="solid"/>
+                      <a:round/>
+                      <a:headEnd type="none" w="med" len="med"/>
+                      <a:tailEnd type="none" w="med" len="med"/>
+                    </a:lnR>
+                    <a:lnT w="12700" cap="flat" cmpd="sng" algn="ctr">
+                      <a:solidFill>
+                        <a:schemeClr val="bg1"/>
+                      </a:solidFill>
+                      <a:prstDash val="solid"/>
+                      <a:round/>
+                      <a:headEnd type="none" w="med" len="med"/>
+                      <a:tailEnd type="none" w="med" len="med"/>
+                    </a:lnT>
+                    <a:lnB w="12700" cap="flat" cmpd="sng" algn="ctr">
+                      <a:solidFill>
+                        <a:schemeClr val="bg1"/>
+                      </a:solidFill>
+                      <a:prstDash val="solid"/>
+                      <a:round/>
+                      <a:headEnd type="none" w="med" len="med"/>
+                      <a:tailEnd type="none" w="med" len="med"/>
+                    </a:lnB>
+                    <a:noFill/>
+                  </a:tcPr>
+                </a:tc>
+                <a:tc>
+                  <a:txBody>
+                    <a:bodyPr/>
+                    <a:lstStyle/>
+                    <a:p>
+                      <a:r>
+                        <a:rPr lang="en-US" sz="1200" dirty="0">
+                          <a:solidFill>
+                            <a:schemeClr val="bg1"/>
+                          </a:solidFill>
+                          <a:latin typeface="Comic Sans MS" panose="030F0902030302020204" pitchFamily="66" charset="0"/>
+                        </a:rPr>
+                        <a:t>Mode</a:t>
+                      </a:r>
+                    </a:p>
+                  </a:txBody>
+                  <a:tcPr>
+                    <a:lnL w="12700" cap="flat" cmpd="sng" algn="ctr">
+                      <a:solidFill>
+                        <a:schemeClr val="bg1"/>
+                      </a:solidFill>
+                      <a:prstDash val="solid"/>
+                      <a:round/>
+                      <a:headEnd type="none" w="med" len="med"/>
+                      <a:tailEnd type="none" w="med" len="med"/>
+                    </a:lnL>
+                    <a:lnR w="12700" cap="flat" cmpd="sng" algn="ctr">
+                      <a:solidFill>
+                        <a:schemeClr val="bg1"/>
+                      </a:solidFill>
+                      <a:prstDash val="solid"/>
+                      <a:round/>
+                      <a:headEnd type="none" w="med" len="med"/>
+                      <a:tailEnd type="none" w="med" len="med"/>
+                    </a:lnR>
+                    <a:lnT w="12700" cap="flat" cmpd="sng" algn="ctr">
+                      <a:solidFill>
+                        <a:schemeClr val="bg1"/>
+                      </a:solidFill>
+                      <a:prstDash val="solid"/>
+                      <a:round/>
+                      <a:headEnd type="none" w="med" len="med"/>
+                      <a:tailEnd type="none" w="med" len="med"/>
+                    </a:lnT>
+                    <a:lnB w="12700" cap="flat" cmpd="sng" algn="ctr">
+                      <a:solidFill>
+                        <a:schemeClr val="bg1"/>
+                      </a:solidFill>
+                      <a:prstDash val="solid"/>
+                      <a:round/>
+                      <a:headEnd type="none" w="med" len="med"/>
+                      <a:tailEnd type="none" w="med" len="med"/>
+                    </a:lnB>
+                    <a:noFill/>
+                  </a:tcPr>
+                </a:tc>
+                <a:tc>
+                  <a:txBody>
+                    <a:bodyPr/>
+                    <a:lstStyle/>
+                    <a:p>
+                      <a:r>
+                        <a:rPr lang="en-US" sz="1200" dirty="0">
+                          <a:solidFill>
+                            <a:schemeClr val="bg1"/>
+                          </a:solidFill>
+                          <a:latin typeface="Comic Sans MS" panose="030F0902030302020204" pitchFamily="66" charset="0"/>
+                        </a:rPr>
+                        <a:t>Module</a:t>
+                      </a:r>
+                    </a:p>
+                  </a:txBody>
+                  <a:tcPr>
+                    <a:lnL w="12700" cap="flat" cmpd="sng" algn="ctr">
+                      <a:solidFill>
+                        <a:schemeClr val="bg1"/>
+                      </a:solidFill>
+                      <a:prstDash val="solid"/>
+                      <a:round/>
+                      <a:headEnd type="none" w="med" len="med"/>
+                      <a:tailEnd type="none" w="med" len="med"/>
+                    </a:lnL>
+                    <a:lnR w="12700" cap="flat" cmpd="sng" algn="ctr">
+                      <a:solidFill>
+                        <a:schemeClr val="bg1"/>
+                      </a:solidFill>
+                      <a:prstDash val="solid"/>
+                      <a:round/>
+                      <a:headEnd type="none" w="med" len="med"/>
+                      <a:tailEnd type="none" w="med" len="med"/>
+                    </a:lnR>
+                    <a:lnT w="12700" cap="flat" cmpd="sng" algn="ctr">
+                      <a:solidFill>
+                        <a:schemeClr val="bg1"/>
+                      </a:solidFill>
+                      <a:prstDash val="solid"/>
+                      <a:round/>
+                      <a:headEnd type="none" w="med" len="med"/>
+                      <a:tailEnd type="none" w="med" len="med"/>
+                    </a:lnT>
+                    <a:lnB w="12700" cap="flat" cmpd="sng" algn="ctr">
+                      <a:solidFill>
+                        <a:schemeClr val="bg1"/>
+                      </a:solidFill>
+                      <a:prstDash val="solid"/>
+                      <a:round/>
+                      <a:headEnd type="none" w="med" len="med"/>
+                      <a:tailEnd type="none" w="med" len="med"/>
+                    </a:lnB>
+                    <a:noFill/>
+                  </a:tcPr>
+                </a:tc>
+                <a:tc>
+                  <a:txBody>
+                    <a:bodyPr/>
+                    <a:lstStyle/>
+                    <a:p>
+                      <a:r>
+                        <a:rPr lang="en-US" sz="1200" dirty="0">
+                          <a:solidFill>
+                            <a:schemeClr val="bg1"/>
+                          </a:solidFill>
+                          <a:latin typeface="Comic Sans MS" panose="030F0902030302020204" pitchFamily="66" charset="0"/>
+                        </a:rPr>
+                        <a:t>Max</a:t>
+                      </a:r>
+                    </a:p>
+                  </a:txBody>
+                  <a:tcPr>
+                    <a:lnL w="12700" cap="flat" cmpd="sng" algn="ctr">
+                      <a:solidFill>
+                        <a:schemeClr val="bg1"/>
+                      </a:solidFill>
+                      <a:prstDash val="solid"/>
+                      <a:round/>
+                      <a:headEnd type="none" w="med" len="med"/>
+                      <a:tailEnd type="none" w="med" len="med"/>
+                    </a:lnL>
+                    <a:lnR w="12700" cap="flat" cmpd="sng" algn="ctr">
+                      <a:solidFill>
+                        <a:schemeClr val="bg1"/>
+                      </a:solidFill>
+                      <a:prstDash val="solid"/>
+                      <a:round/>
+                      <a:headEnd type="none" w="med" len="med"/>
+                      <a:tailEnd type="none" w="med" len="med"/>
+                    </a:lnR>
+                    <a:lnT w="12700" cap="flat" cmpd="sng" algn="ctr">
+                      <a:solidFill>
+                        <a:schemeClr val="bg1"/>
+                      </a:solidFill>
+                      <a:prstDash val="solid"/>
+                      <a:round/>
+                      <a:headEnd type="none" w="med" len="med"/>
+                      <a:tailEnd type="none" w="med" len="med"/>
+                    </a:lnT>
+                    <a:lnB w="12700" cap="flat" cmpd="sng" algn="ctr">
+                      <a:solidFill>
+                        <a:schemeClr val="bg1"/>
+                      </a:solidFill>
+                      <a:prstDash val="solid"/>
+                      <a:round/>
+                      <a:headEnd type="none" w="med" len="med"/>
+                      <a:tailEnd type="none" w="med" len="med"/>
+                    </a:lnB>
+                    <a:noFill/>
+                  </a:tcPr>
+                </a:tc>
+                <a:extLst>
+                  <a:ext uri="{0D108BD9-81ED-4DB2-BD59-A6C34878D82A}">
+                    <a16:rowId xmlns:a16="http://schemas.microsoft.com/office/drawing/2014/main" val="2617531180"/>
+                  </a:ext>
+                </a:extLst>
+              </a:tr>
+              <a:tr h="370840">
+                <a:tc>
+                  <a:txBody>
+                    <a:bodyPr/>
+                    <a:lstStyle/>
+                    <a:p>
+                      <a:r>
+                        <a:rPr lang="en-US" sz="1200" dirty="0">
+                          <a:solidFill>
+                            <a:schemeClr val="bg1"/>
+                          </a:solidFill>
+                          <a:latin typeface="Comic Sans MS" panose="030F0902030302020204" pitchFamily="66" charset="0"/>
+                        </a:rPr>
+                        <a:t>What does the V in MVC stand for?</a:t>
+                      </a:r>
+                    </a:p>
+                  </a:txBody>
+                  <a:tcPr>
+                    <a:lnL w="12700" cap="flat" cmpd="sng" algn="ctr">
+                      <a:solidFill>
+                        <a:schemeClr val="bg1"/>
+                      </a:solidFill>
+                      <a:prstDash val="solid"/>
+                      <a:round/>
+                      <a:headEnd type="none" w="med" len="med"/>
+                      <a:tailEnd type="none" w="med" len="med"/>
+                    </a:lnL>
+                    <a:lnR w="12700" cap="flat" cmpd="sng" algn="ctr">
+                      <a:solidFill>
+                        <a:schemeClr val="bg1"/>
+                      </a:solidFill>
+                      <a:prstDash val="solid"/>
+                      <a:round/>
+                      <a:headEnd type="none" w="med" len="med"/>
+                      <a:tailEnd type="none" w="med" len="med"/>
+                    </a:lnR>
+                    <a:lnT w="12700" cap="flat" cmpd="sng" algn="ctr">
+                      <a:solidFill>
+                        <a:schemeClr val="bg1"/>
+                      </a:solidFill>
+                      <a:prstDash val="solid"/>
+                      <a:round/>
+                      <a:headEnd type="none" w="med" len="med"/>
+                      <a:tailEnd type="none" w="med" len="med"/>
+                    </a:lnT>
+                    <a:lnB w="12700" cap="flat" cmpd="sng" algn="ctr">
+                      <a:solidFill>
+                        <a:schemeClr val="bg1"/>
+                      </a:solidFill>
+                      <a:prstDash val="solid"/>
+                      <a:round/>
+                      <a:headEnd type="none" w="med" len="med"/>
+                      <a:tailEnd type="none" w="med" len="med"/>
+                    </a:lnB>
+                    <a:noFill/>
+                  </a:tcPr>
+                </a:tc>
+                <a:tc>
+                  <a:txBody>
+                    <a:bodyPr/>
+                    <a:lstStyle/>
+                    <a:p>
+                      <a:r>
+                        <a:rPr lang="en-US" sz="1200" dirty="0">
+                          <a:solidFill>
+                            <a:schemeClr val="bg1"/>
+                          </a:solidFill>
+                          <a:latin typeface="Comic Sans MS" panose="030F0902030302020204" pitchFamily="66" charset="0"/>
+                        </a:rPr>
+                        <a:t>View</a:t>
+                      </a:r>
+                    </a:p>
+                  </a:txBody>
+                  <a:tcPr>
+                    <a:lnL w="12700" cap="flat" cmpd="sng" algn="ctr">
+                      <a:solidFill>
+                        <a:schemeClr val="bg1"/>
+                      </a:solidFill>
+                      <a:prstDash val="solid"/>
+                      <a:round/>
+                      <a:headEnd type="none" w="med" len="med"/>
+                      <a:tailEnd type="none" w="med" len="med"/>
+                    </a:lnL>
+                    <a:lnR w="12700" cap="flat" cmpd="sng" algn="ctr">
+                      <a:solidFill>
+                        <a:schemeClr val="bg1"/>
+                      </a:solidFill>
+                      <a:prstDash val="solid"/>
+                      <a:round/>
+                      <a:headEnd type="none" w="med" len="med"/>
+                      <a:tailEnd type="none" w="med" len="med"/>
+                    </a:lnR>
+                    <a:lnT w="12700" cap="flat" cmpd="sng" algn="ctr">
+                      <a:solidFill>
+                        <a:schemeClr val="bg1"/>
+                      </a:solidFill>
+                      <a:prstDash val="solid"/>
+                      <a:round/>
+                      <a:headEnd type="none" w="med" len="med"/>
+                      <a:tailEnd type="none" w="med" len="med"/>
+                    </a:lnT>
+                    <a:lnB w="12700" cap="flat" cmpd="sng" algn="ctr">
+                      <a:solidFill>
+                        <a:schemeClr val="bg1"/>
+                      </a:solidFill>
+                      <a:prstDash val="solid"/>
+                      <a:round/>
+                      <a:headEnd type="none" w="med" len="med"/>
+                      <a:tailEnd type="none" w="med" len="med"/>
+                    </a:lnB>
+                    <a:noFill/>
+                  </a:tcPr>
+                </a:tc>
+                <a:tc>
+                  <a:txBody>
+                    <a:bodyPr/>
+                    <a:lstStyle/>
+                    <a:p>
+                      <a:r>
+                        <a:rPr lang="en-US" sz="1200" dirty="0">
+                          <a:solidFill>
+                            <a:schemeClr val="bg1"/>
+                          </a:solidFill>
+                          <a:latin typeface="Comic Sans MS" panose="030F0902030302020204" pitchFamily="66" charset="0"/>
+                        </a:rPr>
+                        <a:t>Visual</a:t>
+                      </a:r>
+                    </a:p>
+                  </a:txBody>
+                  <a:tcPr>
+                    <a:lnL w="12700" cap="flat" cmpd="sng" algn="ctr">
+                      <a:solidFill>
+                        <a:schemeClr val="bg1"/>
+                      </a:solidFill>
+                      <a:prstDash val="solid"/>
+                      <a:round/>
+                      <a:headEnd type="none" w="med" len="med"/>
+                      <a:tailEnd type="none" w="med" len="med"/>
+                    </a:lnL>
+                    <a:lnR w="12700" cap="flat" cmpd="sng" algn="ctr">
+                      <a:solidFill>
+                        <a:schemeClr val="bg1"/>
+                      </a:solidFill>
+                      <a:prstDash val="solid"/>
+                      <a:round/>
+                      <a:headEnd type="none" w="med" len="med"/>
+                      <a:tailEnd type="none" w="med" len="med"/>
+                    </a:lnR>
+                    <a:lnT w="12700" cap="flat" cmpd="sng" algn="ctr">
+                      <a:solidFill>
+                        <a:schemeClr val="bg1"/>
+                      </a:solidFill>
+                      <a:prstDash val="solid"/>
+                      <a:round/>
+                      <a:headEnd type="none" w="med" len="med"/>
+                      <a:tailEnd type="none" w="med" len="med"/>
+                    </a:lnT>
+                    <a:lnB w="12700" cap="flat" cmpd="sng" algn="ctr">
+                      <a:solidFill>
+                        <a:schemeClr val="bg1"/>
+                      </a:solidFill>
+                      <a:prstDash val="solid"/>
+                      <a:round/>
+                      <a:headEnd type="none" w="med" len="med"/>
+                      <a:tailEnd type="none" w="med" len="med"/>
+                    </a:lnB>
+                    <a:noFill/>
+                  </a:tcPr>
+                </a:tc>
+                <a:tc>
+                  <a:txBody>
+                    <a:bodyPr/>
+                    <a:lstStyle/>
+                    <a:p>
+                      <a:r>
+                        <a:rPr lang="en-US" sz="1200" dirty="0">
+                          <a:solidFill>
+                            <a:schemeClr val="bg1"/>
+                          </a:solidFill>
+                          <a:latin typeface="Comic Sans MS" panose="030F0902030302020204" pitchFamily="66" charset="0"/>
+                        </a:rPr>
+                        <a:t>Vehicle</a:t>
+                      </a:r>
+                    </a:p>
+                  </a:txBody>
+                  <a:tcPr>
+                    <a:lnL w="12700" cap="flat" cmpd="sng" algn="ctr">
+                      <a:solidFill>
+                        <a:schemeClr val="bg1"/>
+                      </a:solidFill>
+                      <a:prstDash val="solid"/>
+                      <a:round/>
+                      <a:headEnd type="none" w="med" len="med"/>
+                      <a:tailEnd type="none" w="med" len="med"/>
+                    </a:lnL>
+                    <a:lnR w="12700" cap="flat" cmpd="sng" algn="ctr">
+                      <a:solidFill>
+                        <a:schemeClr val="bg1"/>
+                      </a:solidFill>
+                      <a:prstDash val="solid"/>
+                      <a:round/>
+                      <a:headEnd type="none" w="med" len="med"/>
+                      <a:tailEnd type="none" w="med" len="med"/>
+                    </a:lnR>
+                    <a:lnT w="12700" cap="flat" cmpd="sng" algn="ctr">
+                      <a:solidFill>
+                        <a:schemeClr val="bg1"/>
+                      </a:solidFill>
+                      <a:prstDash val="solid"/>
+                      <a:round/>
+                      <a:headEnd type="none" w="med" len="med"/>
+                      <a:tailEnd type="none" w="med" len="med"/>
+                    </a:lnT>
+                    <a:lnB w="12700" cap="flat" cmpd="sng" algn="ctr">
+                      <a:solidFill>
+                        <a:schemeClr val="bg1"/>
+                      </a:solidFill>
+                      <a:prstDash val="solid"/>
+                      <a:round/>
+                      <a:headEnd type="none" w="med" len="med"/>
+                      <a:tailEnd type="none" w="med" len="med"/>
+                    </a:lnB>
+                    <a:noFill/>
+                  </a:tcPr>
+                </a:tc>
+                <a:tc>
+                  <a:txBody>
+                    <a:bodyPr/>
+                    <a:lstStyle/>
+                    <a:p>
+                      <a:r>
+                        <a:rPr lang="en-US" sz="1200" dirty="0">
+                          <a:solidFill>
+                            <a:schemeClr val="bg1"/>
+                          </a:solidFill>
+                          <a:latin typeface="Comic Sans MS" panose="030F0902030302020204" pitchFamily="66" charset="0"/>
+                        </a:rPr>
+                        <a:t>Vender</a:t>
+                      </a:r>
+                    </a:p>
+                  </a:txBody>
+                  <a:tcPr>
+                    <a:lnL w="12700" cap="flat" cmpd="sng" algn="ctr">
+                      <a:solidFill>
+                        <a:schemeClr val="bg1"/>
+                      </a:solidFill>
+                      <a:prstDash val="solid"/>
+                      <a:round/>
+                      <a:headEnd type="none" w="med" len="med"/>
+                      <a:tailEnd type="none" w="med" len="med"/>
+                    </a:lnL>
+                    <a:lnR w="12700" cap="flat" cmpd="sng" algn="ctr">
+                      <a:solidFill>
+                        <a:schemeClr val="bg1"/>
+                      </a:solidFill>
+                      <a:prstDash val="solid"/>
+                      <a:round/>
+                      <a:headEnd type="none" w="med" len="med"/>
+                      <a:tailEnd type="none" w="med" len="med"/>
+                    </a:lnR>
+                    <a:lnT w="12700" cap="flat" cmpd="sng" algn="ctr">
+                      <a:solidFill>
+                        <a:schemeClr val="bg1"/>
+                      </a:solidFill>
+                      <a:prstDash val="solid"/>
+                      <a:round/>
+                      <a:headEnd type="none" w="med" len="med"/>
+                      <a:tailEnd type="none" w="med" len="med"/>
+                    </a:lnT>
+                    <a:lnB w="12700" cap="flat" cmpd="sng" algn="ctr">
+                      <a:solidFill>
+                        <a:schemeClr val="bg1"/>
+                      </a:solidFill>
+                      <a:prstDash val="solid"/>
+                      <a:round/>
+                      <a:headEnd type="none" w="med" len="med"/>
+                      <a:tailEnd type="none" w="med" len="med"/>
+                    </a:lnB>
+                    <a:noFill/>
+                  </a:tcPr>
+                </a:tc>
+                <a:tc>
+                  <a:txBody>
+                    <a:bodyPr/>
+                    <a:lstStyle/>
+                    <a:p>
+                      <a:r>
+                        <a:rPr lang="en-US" sz="1200" dirty="0">
+                          <a:solidFill>
+                            <a:schemeClr val="bg1"/>
+                          </a:solidFill>
+                          <a:latin typeface="Comic Sans MS" panose="030F0902030302020204" pitchFamily="66" charset="0"/>
+                        </a:rPr>
+                        <a:t>Venn</a:t>
+                      </a:r>
+                    </a:p>
+                  </a:txBody>
+                  <a:tcPr>
+                    <a:lnL w="12700" cap="flat" cmpd="sng" algn="ctr">
+                      <a:solidFill>
+                        <a:schemeClr val="bg1"/>
+                      </a:solidFill>
+                      <a:prstDash val="solid"/>
+                      <a:round/>
+                      <a:headEnd type="none" w="med" len="med"/>
+                      <a:tailEnd type="none" w="med" len="med"/>
+                    </a:lnL>
+                    <a:lnR w="12700" cap="flat" cmpd="sng" algn="ctr">
+                      <a:solidFill>
+                        <a:schemeClr val="bg1"/>
+                      </a:solidFill>
+                      <a:prstDash val="solid"/>
+                      <a:round/>
+                      <a:headEnd type="none" w="med" len="med"/>
+                      <a:tailEnd type="none" w="med" len="med"/>
+                    </a:lnR>
+                    <a:lnT w="12700" cap="flat" cmpd="sng" algn="ctr">
+                      <a:solidFill>
+                        <a:schemeClr val="bg1"/>
+                      </a:solidFill>
+                      <a:prstDash val="solid"/>
+                      <a:round/>
+                      <a:headEnd type="none" w="med" len="med"/>
+                      <a:tailEnd type="none" w="med" len="med"/>
+                    </a:lnT>
+                    <a:lnB w="12700" cap="flat" cmpd="sng" algn="ctr">
+                      <a:solidFill>
+                        <a:schemeClr val="bg1"/>
+                      </a:solidFill>
+                      <a:prstDash val="solid"/>
+                      <a:round/>
+                      <a:headEnd type="none" w="med" len="med"/>
+                      <a:tailEnd type="none" w="med" len="med"/>
+                    </a:lnB>
+                    <a:noFill/>
+                  </a:tcPr>
+                </a:tc>
+                <a:extLst>
+                  <a:ext uri="{0D108BD9-81ED-4DB2-BD59-A6C34878D82A}">
+                    <a16:rowId xmlns:a16="http://schemas.microsoft.com/office/drawing/2014/main" val="2830196396"/>
+                  </a:ext>
+                </a:extLst>
+              </a:tr>
+              <a:tr h="370840">
+                <a:tc>
+                  <a:txBody>
+                    <a:bodyPr/>
+                    <a:lstStyle/>
+                    <a:p>
+                      <a:r>
+                        <a:rPr lang="en-US" sz="1200" dirty="0">
+                          <a:solidFill>
+                            <a:schemeClr val="bg1"/>
+                          </a:solidFill>
+                          <a:latin typeface="Comic Sans MS" panose="030F0902030302020204" pitchFamily="66" charset="0"/>
+                        </a:rPr>
+                        <a:t>What does the C in MVC stand for?</a:t>
+                      </a:r>
+                    </a:p>
+                  </a:txBody>
+                  <a:tcPr>
+                    <a:lnL w="12700" cap="flat" cmpd="sng" algn="ctr">
+                      <a:solidFill>
+                        <a:schemeClr val="bg1"/>
+                      </a:solidFill>
+                      <a:prstDash val="solid"/>
+                      <a:round/>
+                      <a:headEnd type="none" w="med" len="med"/>
+                      <a:tailEnd type="none" w="med" len="med"/>
+                    </a:lnL>
+                    <a:lnR w="12700" cap="flat" cmpd="sng" algn="ctr">
+                      <a:solidFill>
+                        <a:schemeClr val="bg1"/>
+                      </a:solidFill>
+                      <a:prstDash val="solid"/>
+                      <a:round/>
+                      <a:headEnd type="none" w="med" len="med"/>
+                      <a:tailEnd type="none" w="med" len="med"/>
+                    </a:lnR>
+                    <a:lnT w="12700" cap="flat" cmpd="sng" algn="ctr">
+                      <a:solidFill>
+                        <a:schemeClr val="bg1"/>
+                      </a:solidFill>
+                      <a:prstDash val="solid"/>
+                      <a:round/>
+                      <a:headEnd type="none" w="med" len="med"/>
+                      <a:tailEnd type="none" w="med" len="med"/>
+                    </a:lnT>
+                    <a:lnB w="12700" cap="flat" cmpd="sng" algn="ctr">
+                      <a:solidFill>
+                        <a:schemeClr val="bg1"/>
+                      </a:solidFill>
+                      <a:prstDash val="solid"/>
+                      <a:round/>
+                      <a:headEnd type="none" w="med" len="med"/>
+                      <a:tailEnd type="none" w="med" len="med"/>
+                    </a:lnB>
+                    <a:noFill/>
+                  </a:tcPr>
+                </a:tc>
+                <a:tc>
+                  <a:txBody>
+                    <a:bodyPr/>
+                    <a:lstStyle/>
+                    <a:p>
+                      <a:r>
+                        <a:rPr lang="en-US" sz="1200" dirty="0">
+                          <a:solidFill>
+                            <a:schemeClr val="bg1"/>
+                          </a:solidFill>
+                          <a:latin typeface="Comic Sans MS" panose="030F0902030302020204" pitchFamily="66" charset="0"/>
+                        </a:rPr>
+                        <a:t>Controller</a:t>
+                      </a:r>
+                    </a:p>
+                  </a:txBody>
+                  <a:tcPr>
+                    <a:lnL w="12700" cap="flat" cmpd="sng" algn="ctr">
+                      <a:solidFill>
+                        <a:schemeClr val="bg1"/>
+                      </a:solidFill>
+                      <a:prstDash val="solid"/>
+                      <a:round/>
+                      <a:headEnd type="none" w="med" len="med"/>
+                      <a:tailEnd type="none" w="med" len="med"/>
+                    </a:lnL>
+                    <a:lnR w="12700" cap="flat" cmpd="sng" algn="ctr">
+                      <a:solidFill>
+                        <a:schemeClr val="bg1"/>
+                      </a:solidFill>
+                      <a:prstDash val="solid"/>
+                      <a:round/>
+                      <a:headEnd type="none" w="med" len="med"/>
+                      <a:tailEnd type="none" w="med" len="med"/>
+                    </a:lnR>
+                    <a:lnT w="12700" cap="flat" cmpd="sng" algn="ctr">
+                      <a:solidFill>
+                        <a:schemeClr val="bg1"/>
+                      </a:solidFill>
+                      <a:prstDash val="solid"/>
+                      <a:round/>
+                      <a:headEnd type="none" w="med" len="med"/>
+                      <a:tailEnd type="none" w="med" len="med"/>
+                    </a:lnT>
+                    <a:lnB w="12700" cap="flat" cmpd="sng" algn="ctr">
+                      <a:solidFill>
+                        <a:schemeClr val="bg1"/>
+                      </a:solidFill>
+                      <a:prstDash val="solid"/>
+                      <a:round/>
+                      <a:headEnd type="none" w="med" len="med"/>
+                      <a:tailEnd type="none" w="med" len="med"/>
+                    </a:lnB>
+                    <a:noFill/>
+                  </a:tcPr>
+                </a:tc>
+                <a:tc>
+                  <a:txBody>
+                    <a:bodyPr/>
+                    <a:lstStyle/>
+                    <a:p>
+                      <a:r>
+                        <a:rPr lang="en-US" sz="1200" dirty="0">
+                          <a:solidFill>
+                            <a:schemeClr val="bg1"/>
+                          </a:solidFill>
+                          <a:latin typeface="Comic Sans MS" panose="030F0902030302020204" pitchFamily="66" charset="0"/>
+                        </a:rPr>
+                        <a:t>Cross</a:t>
+                      </a:r>
+                    </a:p>
+                  </a:txBody>
+                  <a:tcPr>
+                    <a:lnL w="12700" cap="flat" cmpd="sng" algn="ctr">
+                      <a:solidFill>
+                        <a:schemeClr val="bg1"/>
+                      </a:solidFill>
+                      <a:prstDash val="solid"/>
+                      <a:round/>
+                      <a:headEnd type="none" w="med" len="med"/>
+                      <a:tailEnd type="none" w="med" len="med"/>
+                    </a:lnL>
+                    <a:lnR w="12700" cap="flat" cmpd="sng" algn="ctr">
+                      <a:solidFill>
+                        <a:schemeClr val="bg1"/>
+                      </a:solidFill>
+                      <a:prstDash val="solid"/>
+                      <a:round/>
+                      <a:headEnd type="none" w="med" len="med"/>
+                      <a:tailEnd type="none" w="med" len="med"/>
+                    </a:lnR>
+                    <a:lnT w="12700" cap="flat" cmpd="sng" algn="ctr">
+                      <a:solidFill>
+                        <a:schemeClr val="bg1"/>
+                      </a:solidFill>
+                      <a:prstDash val="solid"/>
+                      <a:round/>
+                      <a:headEnd type="none" w="med" len="med"/>
+                      <a:tailEnd type="none" w="med" len="med"/>
+                    </a:lnT>
+                    <a:lnB w="12700" cap="flat" cmpd="sng" algn="ctr">
+                      <a:solidFill>
+                        <a:schemeClr val="bg1"/>
+                      </a:solidFill>
+                      <a:prstDash val="solid"/>
+                      <a:round/>
+                      <a:headEnd type="none" w="med" len="med"/>
+                      <a:tailEnd type="none" w="med" len="med"/>
+                    </a:lnB>
+                    <a:noFill/>
+                  </a:tcPr>
+                </a:tc>
+                <a:tc>
+                  <a:txBody>
+                    <a:bodyPr/>
+                    <a:lstStyle/>
+                    <a:p>
+                      <a:r>
+                        <a:rPr lang="en-US" sz="1200" dirty="0">
+                          <a:solidFill>
+                            <a:schemeClr val="bg1"/>
+                          </a:solidFill>
+                          <a:latin typeface="Comic Sans MS" panose="030F0902030302020204" pitchFamily="66" charset="0"/>
+                        </a:rPr>
+                        <a:t>Circuit</a:t>
+                      </a:r>
+                    </a:p>
+                  </a:txBody>
+                  <a:tcPr>
+                    <a:lnL w="12700" cap="flat" cmpd="sng" algn="ctr">
+                      <a:solidFill>
+                        <a:schemeClr val="bg1"/>
+                      </a:solidFill>
+                      <a:prstDash val="solid"/>
+                      <a:round/>
+                      <a:headEnd type="none" w="med" len="med"/>
+                      <a:tailEnd type="none" w="med" len="med"/>
+                    </a:lnL>
+                    <a:lnR w="12700" cap="flat" cmpd="sng" algn="ctr">
+                      <a:solidFill>
+                        <a:schemeClr val="bg1"/>
+                      </a:solidFill>
+                      <a:prstDash val="solid"/>
+                      <a:round/>
+                      <a:headEnd type="none" w="med" len="med"/>
+                      <a:tailEnd type="none" w="med" len="med"/>
+                    </a:lnR>
+                    <a:lnT w="12700" cap="flat" cmpd="sng" algn="ctr">
+                      <a:solidFill>
+                        <a:schemeClr val="bg1"/>
+                      </a:solidFill>
+                      <a:prstDash val="solid"/>
+                      <a:round/>
+                      <a:headEnd type="none" w="med" len="med"/>
+                      <a:tailEnd type="none" w="med" len="med"/>
+                    </a:lnT>
+                    <a:lnB w="12700" cap="flat" cmpd="sng" algn="ctr">
+                      <a:solidFill>
+                        <a:schemeClr val="bg1"/>
+                      </a:solidFill>
+                      <a:prstDash val="solid"/>
+                      <a:round/>
+                      <a:headEnd type="none" w="med" len="med"/>
+                      <a:tailEnd type="none" w="med" len="med"/>
+                    </a:lnB>
+                    <a:noFill/>
+                  </a:tcPr>
+                </a:tc>
+                <a:tc>
+                  <a:txBody>
+                    <a:bodyPr/>
+                    <a:lstStyle/>
+                    <a:p>
+                      <a:r>
+                        <a:rPr lang="en-US" sz="1200" dirty="0">
+                          <a:solidFill>
+                            <a:schemeClr val="bg1"/>
+                          </a:solidFill>
+                          <a:latin typeface="Comic Sans MS" panose="030F0902030302020204" pitchFamily="66" charset="0"/>
+                        </a:rPr>
+                        <a:t>Constructor</a:t>
+                      </a:r>
+                    </a:p>
+                  </a:txBody>
+                  <a:tcPr>
+                    <a:lnL w="12700" cap="flat" cmpd="sng" algn="ctr">
+                      <a:solidFill>
+                        <a:schemeClr val="bg1"/>
+                      </a:solidFill>
+                      <a:prstDash val="solid"/>
+                      <a:round/>
+                      <a:headEnd type="none" w="med" len="med"/>
+                      <a:tailEnd type="none" w="med" len="med"/>
+                    </a:lnL>
+                    <a:lnR w="12700" cap="flat" cmpd="sng" algn="ctr">
+                      <a:solidFill>
+                        <a:schemeClr val="bg1"/>
+                      </a:solidFill>
+                      <a:prstDash val="solid"/>
+                      <a:round/>
+                      <a:headEnd type="none" w="med" len="med"/>
+                      <a:tailEnd type="none" w="med" len="med"/>
+                    </a:lnR>
+                    <a:lnT w="12700" cap="flat" cmpd="sng" algn="ctr">
+                      <a:solidFill>
+                        <a:schemeClr val="bg1"/>
+                      </a:solidFill>
+                      <a:prstDash val="solid"/>
+                      <a:round/>
+                      <a:headEnd type="none" w="med" len="med"/>
+                      <a:tailEnd type="none" w="med" len="med"/>
+                    </a:lnT>
+                    <a:lnB w="12700" cap="flat" cmpd="sng" algn="ctr">
+                      <a:solidFill>
+                        <a:schemeClr val="bg1"/>
+                      </a:solidFill>
+                      <a:prstDash val="solid"/>
+                      <a:round/>
+                      <a:headEnd type="none" w="med" len="med"/>
+                      <a:tailEnd type="none" w="med" len="med"/>
+                    </a:lnB>
+                    <a:noFill/>
+                  </a:tcPr>
+                </a:tc>
+                <a:tc>
+                  <a:txBody>
+                    <a:bodyPr/>
+                    <a:lstStyle/>
+                    <a:p>
+                      <a:r>
+                        <a:rPr lang="en-US" sz="1200" dirty="0">
+                          <a:solidFill>
+                            <a:schemeClr val="bg1"/>
+                          </a:solidFill>
+                          <a:latin typeface="Comic Sans MS" panose="030F0902030302020204" pitchFamily="66" charset="0"/>
+                        </a:rPr>
+                        <a:t>Command</a:t>
+                      </a:r>
+                    </a:p>
+                  </a:txBody>
+                  <a:tcPr>
+                    <a:lnL w="12700" cap="flat" cmpd="sng" algn="ctr">
+                      <a:solidFill>
+                        <a:schemeClr val="bg1"/>
+                      </a:solidFill>
+                      <a:prstDash val="solid"/>
+                      <a:round/>
+                      <a:headEnd type="none" w="med" len="med"/>
+                      <a:tailEnd type="none" w="med" len="med"/>
+                    </a:lnL>
+                    <a:lnR w="12700" cap="flat" cmpd="sng" algn="ctr">
+                      <a:solidFill>
+                        <a:schemeClr val="bg1"/>
+                      </a:solidFill>
+                      <a:prstDash val="solid"/>
+                      <a:round/>
+                      <a:headEnd type="none" w="med" len="med"/>
+                      <a:tailEnd type="none" w="med" len="med"/>
+                    </a:lnR>
+                    <a:lnT w="12700" cap="flat" cmpd="sng" algn="ctr">
+                      <a:solidFill>
+                        <a:schemeClr val="bg1"/>
+                      </a:solidFill>
+                      <a:prstDash val="solid"/>
+                      <a:round/>
+                      <a:headEnd type="none" w="med" len="med"/>
+                      <a:tailEnd type="none" w="med" len="med"/>
+                    </a:lnT>
+                    <a:lnB w="12700" cap="flat" cmpd="sng" algn="ctr">
+                      <a:solidFill>
+                        <a:schemeClr val="bg1"/>
+                      </a:solidFill>
+                      <a:prstDash val="solid"/>
+                      <a:round/>
+                      <a:headEnd type="none" w="med" len="med"/>
+                      <a:tailEnd type="none" w="med" len="med"/>
+                    </a:lnB>
+                    <a:noFill/>
+                  </a:tcPr>
+                </a:tc>
+                <a:extLst>
+                  <a:ext uri="{0D108BD9-81ED-4DB2-BD59-A6C34878D82A}">
+                    <a16:rowId xmlns:a16="http://schemas.microsoft.com/office/drawing/2014/main" val="2129855210"/>
+                  </a:ext>
+                </a:extLst>
+              </a:tr>
+            </a:tbl>
+          </a:graphicData>
+        </a:graphic>
+      </p:graphicFrame>
+    </p:spTree>
+    <p:extLst>
+      <p:ext uri="{BB962C8B-B14F-4D97-AF65-F5344CB8AC3E}">
+        <p14:creationId xmlns:p14="http://schemas.microsoft.com/office/powerpoint/2010/main" val="61550048"/>
+      </p:ext>
+    </p:extLst>
+  </p:cSld>
+  <p:clrMapOvr>
+    <a:masterClrMapping/>
+  </p:clrMapOvr>
+</p:sld>
+</file>
+
+<file path=ppt/slides/slide31.xml><?xml version="1.0" encoding="utf-8"?>
+<p:sld xmlns:a="http://schemas.openxmlformats.org/drawingml/2006/main" xmlns:r="http://schemas.openxmlformats.org/officeDocument/2006/relationships" xmlns:p="http://schemas.openxmlformats.org/presentationml/2006/main">
+  <p:cSld>
+    <p:spTree>
+      <p:nvGrpSpPr>
+        <p:cNvPr id="1" name=""/>
+        <p:cNvGrpSpPr/>
+        <p:nvPr/>
+      </p:nvGrpSpPr>
+      <p:grpSpPr>
+        <a:xfrm>
+          <a:off x="0" y="0"/>
+          <a:ext cx="0" cy="0"/>
+          <a:chOff x="0" y="0"/>
+          <a:chExt cx="0" cy="0"/>
+        </a:xfrm>
+      </p:grpSpPr>
+      <p:sp>
+        <p:nvSpPr>
+          <p:cNvPr id="2" name="TextBox 1">
+            <a:extLst>
+              <a:ext uri="{FF2B5EF4-FFF2-40B4-BE49-F238E27FC236}">
+                <a16:creationId xmlns:a16="http://schemas.microsoft.com/office/drawing/2014/main" id="{221DED5B-F56B-0F43-A308-4F2DD034B5B7}"/>
+              </a:ext>
+            </a:extLst>
+          </p:cNvPr>
+          <p:cNvSpPr txBox="1"/>
+          <p:nvPr/>
+        </p:nvSpPr>
+        <p:spPr>
+          <a:xfrm>
+            <a:off x="1390398" y="1266033"/>
+            <a:ext cx="1132041" cy="338554"/>
+          </a:xfrm>
+          <a:prstGeom prst="rect">
+            <a:avLst/>
+          </a:prstGeom>
+          <a:noFill/>
+        </p:spPr>
+        <p:txBody>
+          <a:bodyPr wrap="none" rtlCol="0">
+            <a:spAutoFit/>
+          </a:bodyPr>
+          <a:lstStyle/>
+          <a:p>
+            <a:r>
+              <a:rPr lang="en-US" sz="1600" b="1" dirty="0">
+                <a:solidFill>
+                  <a:schemeClr val="bg1"/>
+                </a:solidFill>
+                <a:latin typeface="Comic Sans MS" panose="030F0902030302020204" pitchFamily="66" charset="0"/>
+              </a:rPr>
+              <a:t>Edit Quiz</a:t>
+            </a:r>
+          </a:p>
+        </p:txBody>
+      </p:sp>
+      <p:sp>
+        <p:nvSpPr>
+          <p:cNvPr id="7" name="TextBox 6">
+            <a:extLst>
+              <a:ext uri="{FF2B5EF4-FFF2-40B4-BE49-F238E27FC236}">
+                <a16:creationId xmlns:a16="http://schemas.microsoft.com/office/drawing/2014/main" id="{F3573DF9-457D-7948-8B22-DB5337292FA7}"/>
+              </a:ext>
+            </a:extLst>
+          </p:cNvPr>
+          <p:cNvSpPr txBox="1"/>
+          <p:nvPr/>
+        </p:nvSpPr>
+        <p:spPr>
+          <a:xfrm>
+            <a:off x="1784068" y="292529"/>
+            <a:ext cx="873957" cy="276999"/>
+          </a:xfrm>
+          <a:prstGeom prst="rect">
+            <a:avLst/>
+          </a:prstGeom>
+          <a:noFill/>
+        </p:spPr>
+        <p:txBody>
+          <a:bodyPr wrap="none" rtlCol="0">
+            <a:spAutoFit/>
+          </a:bodyPr>
+          <a:lstStyle/>
+          <a:p>
+            <a:r>
+              <a:rPr lang="en-US" sz="1200" dirty="0">
+                <a:solidFill>
+                  <a:schemeClr val="bg1"/>
+                </a:solidFill>
+                <a:latin typeface="Comic Sans MS" panose="030F0902030302020204" pitchFamily="66" charset="0"/>
+              </a:rPr>
+              <a:t>Edit Quiz</a:t>
+            </a:r>
+          </a:p>
+        </p:txBody>
+      </p:sp>
+      <p:sp>
+        <p:nvSpPr>
+          <p:cNvPr id="8" name="TextBox 7">
+            <a:extLst>
+              <a:ext uri="{FF2B5EF4-FFF2-40B4-BE49-F238E27FC236}">
+                <a16:creationId xmlns:a16="http://schemas.microsoft.com/office/drawing/2014/main" id="{49DF0299-C639-944C-9F0E-91BE71AC7E52}"/>
+              </a:ext>
+            </a:extLst>
+          </p:cNvPr>
+          <p:cNvSpPr txBox="1"/>
+          <p:nvPr/>
+        </p:nvSpPr>
+        <p:spPr>
+          <a:xfrm>
+            <a:off x="2233351" y="581403"/>
+            <a:ext cx="2914580" cy="276999"/>
+          </a:xfrm>
+          <a:prstGeom prst="rect">
+            <a:avLst/>
+          </a:prstGeom>
+          <a:noFill/>
+        </p:spPr>
+        <p:txBody>
+          <a:bodyPr wrap="none" rtlCol="0">
+            <a:spAutoFit/>
+          </a:bodyPr>
+          <a:lstStyle/>
+          <a:p>
+            <a:r>
+              <a:rPr lang="en-US" sz="1200" dirty="0">
+                <a:solidFill>
+                  <a:schemeClr val="bg1"/>
+                </a:solidFill>
+                <a:latin typeface="Comic Sans MS" panose="030F0902030302020204" pitchFamily="66" charset="0"/>
+              </a:rPr>
+              <a:t>http://localhost:3000/quizzes/1/edit</a:t>
+            </a:r>
+          </a:p>
+        </p:txBody>
+      </p:sp>
+      <p:sp>
+        <p:nvSpPr>
+          <p:cNvPr id="10" name="TextBox 9">
+            <a:extLst>
+              <a:ext uri="{FF2B5EF4-FFF2-40B4-BE49-F238E27FC236}">
+                <a16:creationId xmlns:a16="http://schemas.microsoft.com/office/drawing/2014/main" id="{C8E10E37-1019-8D4C-BA6F-9A6E9CF0D317}"/>
+              </a:ext>
+            </a:extLst>
+          </p:cNvPr>
+          <p:cNvSpPr txBox="1"/>
+          <p:nvPr/>
+        </p:nvSpPr>
+        <p:spPr>
+          <a:xfrm>
+            <a:off x="1390398" y="1882183"/>
+            <a:ext cx="8706102" cy="4832092"/>
+          </a:xfrm>
+          <a:prstGeom prst="rect">
+            <a:avLst/>
+          </a:prstGeom>
+          <a:noFill/>
+        </p:spPr>
+        <p:txBody>
+          <a:bodyPr wrap="square" rtlCol="0">
+            <a:spAutoFit/>
+          </a:bodyPr>
+          <a:lstStyle/>
+          <a:p>
+            <a:r>
+              <a:rPr lang="en-US" sz="1400" dirty="0">
+                <a:solidFill>
+                  <a:schemeClr val="bg1"/>
+                </a:solidFill>
+                <a:latin typeface="Comic Sans MS" panose="030F0902030302020204" pitchFamily="66" charset="0"/>
+              </a:rPr>
+              <a:t>Title</a:t>
+            </a:r>
+          </a:p>
+          <a:p>
+            <a:endParaRPr lang="en-US" sz="1400" dirty="0">
+              <a:solidFill>
+                <a:schemeClr val="bg1"/>
+              </a:solidFill>
+              <a:latin typeface="Comic Sans MS" panose="030F0902030302020204" pitchFamily="66" charset="0"/>
+            </a:endParaRPr>
+          </a:p>
+          <a:p>
+            <a:endParaRPr lang="en-US" sz="1400" dirty="0">
+              <a:solidFill>
+                <a:schemeClr val="bg1"/>
+              </a:solidFill>
+              <a:latin typeface="Comic Sans MS" panose="030F0902030302020204" pitchFamily="66" charset="0"/>
+            </a:endParaRPr>
+          </a:p>
+          <a:p>
+            <a:r>
+              <a:rPr lang="en-US" sz="1400" dirty="0">
+                <a:solidFill>
+                  <a:schemeClr val="bg1"/>
+                </a:solidFill>
+                <a:latin typeface="Comic Sans MS" panose="030F0902030302020204" pitchFamily="66" charset="0"/>
+              </a:rPr>
+              <a:t>Description</a:t>
+            </a:r>
+          </a:p>
+          <a:p>
+            <a:endParaRPr lang="en-US" sz="1400" dirty="0">
+              <a:solidFill>
+                <a:schemeClr val="bg1"/>
+              </a:solidFill>
+              <a:latin typeface="Comic Sans MS" panose="030F0902030302020204" pitchFamily="66" charset="0"/>
+            </a:endParaRPr>
+          </a:p>
+          <a:p>
+            <a:endParaRPr lang="en-US" sz="1400" dirty="0">
+              <a:solidFill>
+                <a:schemeClr val="bg1"/>
+              </a:solidFill>
+              <a:latin typeface="Comic Sans MS" panose="030F0902030302020204" pitchFamily="66" charset="0"/>
+            </a:endParaRPr>
+          </a:p>
+          <a:p>
+            <a:endParaRPr lang="en-US" sz="1400" dirty="0">
+              <a:solidFill>
+                <a:schemeClr val="bg1"/>
+              </a:solidFill>
+              <a:latin typeface="Comic Sans MS" panose="030F0902030302020204" pitchFamily="66" charset="0"/>
+            </a:endParaRPr>
+          </a:p>
+          <a:p>
+            <a:endParaRPr lang="en-US" sz="1400" dirty="0">
+              <a:solidFill>
+                <a:schemeClr val="bg1"/>
+              </a:solidFill>
+              <a:latin typeface="Comic Sans MS" panose="030F0902030302020204" pitchFamily="66" charset="0"/>
+            </a:endParaRPr>
+          </a:p>
+          <a:p>
+            <a:endParaRPr lang="en-US" sz="1400" dirty="0">
+              <a:solidFill>
+                <a:schemeClr val="bg1"/>
+              </a:solidFill>
+              <a:latin typeface="Comic Sans MS" panose="030F0902030302020204" pitchFamily="66" charset="0"/>
+            </a:endParaRPr>
+          </a:p>
+          <a:p>
+            <a:endParaRPr lang="en-US" sz="1400" dirty="0">
+              <a:solidFill>
+                <a:schemeClr val="bg1"/>
+              </a:solidFill>
+              <a:latin typeface="Comic Sans MS" panose="030F0902030302020204" pitchFamily="66" charset="0"/>
+            </a:endParaRPr>
+          </a:p>
+          <a:p>
+            <a:endParaRPr lang="en-US" sz="1400" u="sng" dirty="0">
+              <a:solidFill>
+                <a:srgbClr val="0432FF"/>
+              </a:solidFill>
+              <a:latin typeface="Comic Sans MS" panose="030F0902030302020204" pitchFamily="66" charset="0"/>
+            </a:endParaRPr>
+          </a:p>
+          <a:p>
+            <a:endParaRPr lang="en-US" sz="1400" u="sng" dirty="0">
+              <a:solidFill>
+                <a:srgbClr val="0432FF"/>
+              </a:solidFill>
+              <a:latin typeface="Comic Sans MS" panose="030F0902030302020204" pitchFamily="66" charset="0"/>
+            </a:endParaRPr>
+          </a:p>
+          <a:p>
+            <a:endParaRPr lang="en-US" sz="1400" u="sng" dirty="0">
+              <a:solidFill>
+                <a:srgbClr val="0432FF"/>
+              </a:solidFill>
+              <a:latin typeface="Comic Sans MS" panose="030F0902030302020204" pitchFamily="66" charset="0"/>
+            </a:endParaRPr>
+          </a:p>
+          <a:p>
+            <a:endParaRPr lang="en-US" sz="1400" u="sng" dirty="0">
+              <a:solidFill>
+                <a:srgbClr val="0432FF"/>
+              </a:solidFill>
+              <a:latin typeface="Comic Sans MS" panose="030F0902030302020204" pitchFamily="66" charset="0"/>
+            </a:endParaRPr>
+          </a:p>
+          <a:p>
+            <a:endParaRPr lang="en-US" sz="1400" u="sng" dirty="0">
+              <a:solidFill>
+                <a:srgbClr val="0432FF"/>
+              </a:solidFill>
+              <a:latin typeface="Comic Sans MS" panose="030F0902030302020204" pitchFamily="66" charset="0"/>
+            </a:endParaRPr>
+          </a:p>
+          <a:p>
+            <a:endParaRPr lang="en-US" sz="1400" u="sng" dirty="0">
+              <a:solidFill>
+                <a:srgbClr val="0432FF"/>
+              </a:solidFill>
+              <a:latin typeface="Comic Sans MS" panose="030F0902030302020204" pitchFamily="66" charset="0"/>
+            </a:endParaRPr>
+          </a:p>
+          <a:p>
+            <a:endParaRPr lang="en-US" sz="1400" u="sng" dirty="0">
+              <a:solidFill>
+                <a:srgbClr val="0432FF"/>
+              </a:solidFill>
+              <a:latin typeface="Comic Sans MS" panose="030F0902030302020204" pitchFamily="66" charset="0"/>
+            </a:endParaRPr>
+          </a:p>
+          <a:p>
+            <a:endParaRPr lang="en-US" sz="1400" u="sng" dirty="0">
+              <a:solidFill>
+                <a:srgbClr val="0432FF"/>
+              </a:solidFill>
+              <a:latin typeface="Comic Sans MS" panose="030F0902030302020204" pitchFamily="66" charset="0"/>
+            </a:endParaRPr>
+          </a:p>
+          <a:p>
+            <a:endParaRPr lang="en-US" sz="1400" u="sng" dirty="0">
+              <a:solidFill>
+                <a:srgbClr val="0432FF"/>
+              </a:solidFill>
+              <a:latin typeface="Comic Sans MS" panose="030F0902030302020204" pitchFamily="66" charset="0"/>
+            </a:endParaRPr>
+          </a:p>
+          <a:p>
+            <a:endParaRPr lang="en-US" sz="1400" u="sng" dirty="0">
+              <a:solidFill>
+                <a:srgbClr val="0432FF"/>
+              </a:solidFill>
+              <a:latin typeface="Comic Sans MS" panose="030F0902030302020204" pitchFamily="66" charset="0"/>
+            </a:endParaRPr>
+          </a:p>
+          <a:p>
+            <a:endParaRPr lang="en-US" sz="1400" u="sng" dirty="0">
+              <a:solidFill>
+                <a:srgbClr val="0432FF"/>
+              </a:solidFill>
+              <a:latin typeface="Comic Sans MS" panose="030F0902030302020204" pitchFamily="66" charset="0"/>
+            </a:endParaRPr>
+          </a:p>
+          <a:p>
+            <a:r>
+              <a:rPr lang="en-US" sz="1400" u="sng" dirty="0">
+                <a:solidFill>
+                  <a:srgbClr val="0432FF"/>
+                </a:solidFill>
+                <a:latin typeface="Comic Sans MS" panose="030F0902030302020204" pitchFamily="66" charset="0"/>
+              </a:rPr>
+              <a:t>Back</a:t>
+            </a:r>
+          </a:p>
+        </p:txBody>
+      </p:sp>
+      <p:sp>
+        <p:nvSpPr>
+          <p:cNvPr id="4" name="TextBox 3">
+            <a:extLst>
+              <a:ext uri="{FF2B5EF4-FFF2-40B4-BE49-F238E27FC236}">
+                <a16:creationId xmlns:a16="http://schemas.microsoft.com/office/drawing/2014/main" id="{32820AB9-7CA6-8F41-A812-9F4C46331562}"/>
+              </a:ext>
+            </a:extLst>
+          </p:cNvPr>
+          <p:cNvSpPr txBox="1"/>
+          <p:nvPr/>
+        </p:nvSpPr>
+        <p:spPr>
+          <a:xfrm>
+            <a:off x="1485404" y="2174592"/>
+            <a:ext cx="4077196" cy="307777"/>
+          </a:xfrm>
+          <a:prstGeom prst="rect">
+            <a:avLst/>
+          </a:prstGeom>
+          <a:noFill/>
+          <a:ln>
+            <a:solidFill>
+              <a:schemeClr val="bg1"/>
+            </a:solidFill>
+          </a:ln>
+        </p:spPr>
+        <p:txBody>
+          <a:bodyPr wrap="square" rtlCol="0">
+            <a:spAutoFit/>
+          </a:bodyPr>
+          <a:lstStyle/>
+          <a:p>
+            <a:r>
+              <a:rPr lang="en-US" sz="1400" dirty="0">
+                <a:solidFill>
+                  <a:schemeClr val="bg1"/>
+                </a:solidFill>
+                <a:latin typeface="Comic Sans MS" panose="030F0902030302020204" pitchFamily="66" charset="0"/>
+              </a:rPr>
+              <a:t>Rails MVC</a:t>
+            </a:r>
+          </a:p>
+        </p:txBody>
+      </p:sp>
+      <p:sp>
+        <p:nvSpPr>
+          <p:cNvPr id="11" name="TextBox 10">
+            <a:extLst>
+              <a:ext uri="{FF2B5EF4-FFF2-40B4-BE49-F238E27FC236}">
+                <a16:creationId xmlns:a16="http://schemas.microsoft.com/office/drawing/2014/main" id="{5880DF0C-DDBC-A243-8BC6-846ACCD4FA07}"/>
+              </a:ext>
+            </a:extLst>
+          </p:cNvPr>
+          <p:cNvSpPr txBox="1"/>
+          <p:nvPr/>
+        </p:nvSpPr>
+        <p:spPr>
+          <a:xfrm>
+            <a:off x="1485404" y="2811235"/>
+            <a:ext cx="4077196" cy="523220"/>
+          </a:xfrm>
+          <a:prstGeom prst="rect">
+            <a:avLst/>
+          </a:prstGeom>
+          <a:noFill/>
+          <a:ln>
+            <a:solidFill>
+              <a:schemeClr val="bg1"/>
+            </a:solidFill>
+          </a:ln>
+        </p:spPr>
+        <p:txBody>
+          <a:bodyPr wrap="square" rtlCol="0">
+            <a:spAutoFit/>
+          </a:bodyPr>
+          <a:lstStyle/>
+          <a:p>
+            <a:r>
+              <a:rPr lang="en-US" sz="1400" dirty="0">
+                <a:solidFill>
+                  <a:schemeClr val="bg1"/>
+                </a:solidFill>
+                <a:latin typeface="Comic Sans MS" panose="030F0902030302020204" pitchFamily="66" charset="0"/>
+              </a:rPr>
+              <a:t>Covers concepts and common tasks in the Rails Model-View-Controller architecture.</a:t>
+            </a:r>
+          </a:p>
+        </p:txBody>
+      </p:sp>
+      <p:sp>
+        <p:nvSpPr>
+          <p:cNvPr id="5" name="Rounded Rectangle 4">
+            <a:extLst>
+              <a:ext uri="{FF2B5EF4-FFF2-40B4-BE49-F238E27FC236}">
+                <a16:creationId xmlns:a16="http://schemas.microsoft.com/office/drawing/2014/main" id="{1376ECFE-A6F2-6C42-A904-0E15AFF7920D}"/>
+              </a:ext>
+            </a:extLst>
+          </p:cNvPr>
+          <p:cNvSpPr/>
+          <p:nvPr/>
+        </p:nvSpPr>
+        <p:spPr>
+          <a:xfrm>
+            <a:off x="1485405" y="3531785"/>
+            <a:ext cx="1054668" cy="327860"/>
+          </a:xfrm>
+          <a:prstGeom prst="roundRect">
+            <a:avLst/>
+          </a:prstGeom>
+          <a:solidFill>
+            <a:schemeClr val="tx2"/>
+          </a:solidFill>
+          <a:ln>
+            <a:solidFill>
+              <a:schemeClr val="bg1"/>
+            </a:solidFill>
+          </a:ln>
+        </p:spPr>
+        <p:style>
+          <a:lnRef idx="2">
+            <a:schemeClr val="accent1">
+              <a:shade val="50000"/>
+            </a:schemeClr>
+          </a:lnRef>
+          <a:fillRef idx="1">
+            <a:schemeClr val="accent1"/>
+          </a:fillRef>
+          <a:effectRef idx="0">
+            <a:schemeClr val="accent1"/>
+          </a:effectRef>
+          <a:fontRef idx="minor">
+            <a:schemeClr val="lt1"/>
+          </a:fontRef>
+        </p:style>
+        <p:txBody>
+          <a:bodyPr rtlCol="0" anchor="ctr"/>
+          <a:lstStyle/>
+          <a:p>
+            <a:pPr algn="ctr"/>
+            <a:r>
+              <a:rPr lang="en-US" sz="1400" dirty="0">
+                <a:solidFill>
+                  <a:schemeClr val="bg1"/>
+                </a:solidFill>
+                <a:latin typeface="Comic Sans MS" panose="030F0902030302020204" pitchFamily="66" charset="0"/>
+              </a:rPr>
+              <a:t>Submit</a:t>
+            </a:r>
+          </a:p>
+        </p:txBody>
+      </p:sp>
+      <p:sp>
+        <p:nvSpPr>
+          <p:cNvPr id="16" name="Rectangle 15">
+            <a:extLst>
+              <a:ext uri="{FF2B5EF4-FFF2-40B4-BE49-F238E27FC236}">
+                <a16:creationId xmlns:a16="http://schemas.microsoft.com/office/drawing/2014/main" id="{52B8FCA2-1E89-234D-BAB5-889D33F5AF60}"/>
+              </a:ext>
+            </a:extLst>
+          </p:cNvPr>
+          <p:cNvSpPr/>
+          <p:nvPr/>
+        </p:nvSpPr>
+        <p:spPr>
+          <a:xfrm>
+            <a:off x="1175657" y="870277"/>
+            <a:ext cx="9832769" cy="344384"/>
+          </a:xfrm>
+          <a:prstGeom prst="rect">
+            <a:avLst/>
+          </a:prstGeom>
+          <a:solidFill>
+            <a:schemeClr val="bg1"/>
+          </a:solidFill>
+          <a:ln>
+            <a:noFill/>
+          </a:ln>
+        </p:spPr>
+        <p:style>
+          <a:lnRef idx="2">
+            <a:schemeClr val="accent1">
+              <a:shade val="50000"/>
+            </a:schemeClr>
+          </a:lnRef>
+          <a:fillRef idx="1">
+            <a:schemeClr val="accent1"/>
+          </a:fillRef>
+          <a:effectRef idx="0">
+            <a:schemeClr val="accent1"/>
+          </a:effectRef>
+          <a:fontRef idx="minor">
+            <a:schemeClr val="lt1"/>
+          </a:fontRef>
+        </p:style>
+        <p:txBody>
+          <a:bodyPr rtlCol="0" anchor="ctr"/>
+          <a:lstStyle/>
+          <a:p>
+            <a:r>
+              <a:rPr lang="en-US" sz="1400" dirty="0">
+                <a:solidFill>
+                  <a:schemeClr val="tx1"/>
+                </a:solidFill>
+                <a:latin typeface="Comic Sans MS" panose="030F0902030302020204" pitchFamily="66" charset="0"/>
+              </a:rPr>
+              <a:t>Wapp  Home  About  Teachers</a:t>
+            </a:r>
+          </a:p>
+        </p:txBody>
+      </p:sp>
+      <p:graphicFrame>
+        <p:nvGraphicFramePr>
+          <p:cNvPr id="17" name="Table 16">
+            <a:extLst>
+              <a:ext uri="{FF2B5EF4-FFF2-40B4-BE49-F238E27FC236}">
+                <a16:creationId xmlns:a16="http://schemas.microsoft.com/office/drawing/2014/main" id="{6465426E-B785-024B-BC7E-89EB73168C41}"/>
+              </a:ext>
+            </a:extLst>
+          </p:cNvPr>
+          <p:cNvGraphicFramePr>
+            <a:graphicFrameLocks noGrp="1"/>
+          </p:cNvGraphicFramePr>
+          <p:nvPr>
+            <p:extLst>
+              <p:ext uri="{D42A27DB-BD31-4B8C-83A1-F6EECF244321}">
+                <p14:modId xmlns:p14="http://schemas.microsoft.com/office/powerpoint/2010/main" val="1811189611"/>
+              </p:ext>
+            </p:extLst>
+          </p:nvPr>
+        </p:nvGraphicFramePr>
+        <p:xfrm>
+          <a:off x="1389412" y="4311418"/>
           <a:ext cx="9440890" cy="1742440"/>
         </p:xfrm>
         <a:graphic>
@@ -19263,7 +21624,7 @@
         </p:nvSpPr>
         <p:spPr>
           <a:xfrm>
-            <a:off x="1389412" y="5654990"/>
+            <a:off x="1389412" y="6086790"/>
             <a:ext cx="2693366" cy="307777"/>
           </a:xfrm>
           <a:prstGeom prst="rect">
@@ -19290,42 +21651,12 @@
           </a:p>
         </p:txBody>
       </p:sp>
-    </p:spTree>
-    <p:extLst>
-      <p:ext uri="{BB962C8B-B14F-4D97-AF65-F5344CB8AC3E}">
-        <p14:creationId xmlns:p14="http://schemas.microsoft.com/office/powerpoint/2010/main" val="3664061300"/>
-      </p:ext>
-    </p:extLst>
-  </p:cSld>
-  <p:clrMapOvr>
-    <a:masterClrMapping/>
-  </p:clrMapOvr>
-</p:sld>
-</file>
-
-<file path=ppt/slides/slide3.xml><?xml version="1.0" encoding="utf-8"?>
-<p:sld xmlns:a="http://schemas.openxmlformats.org/drawingml/2006/main" xmlns:r="http://schemas.openxmlformats.org/officeDocument/2006/relationships" xmlns:p="http://schemas.openxmlformats.org/presentationml/2006/main">
-  <p:cSld>
-    <p:spTree>
-      <p:nvGrpSpPr>
-        <p:cNvPr id="1" name=""/>
-        <p:cNvGrpSpPr/>
-        <p:nvPr/>
-      </p:nvGrpSpPr>
-      <p:grpSpPr>
-        <a:xfrm>
-          <a:off x="0" y="0"/>
-          <a:ext cx="0" cy="0"/>
-          <a:chOff x="0" y="0"/>
-          <a:chExt cx="0" cy="0"/>
-        </a:xfrm>
-      </p:grpSpPr>
       <p:sp>
         <p:nvSpPr>
-          <p:cNvPr id="2" name="TextBox 1">
+          <p:cNvPr id="19" name="TextBox 18">
             <a:extLst>
               <a:ext uri="{FF2B5EF4-FFF2-40B4-BE49-F238E27FC236}">
-                <a16:creationId xmlns:a16="http://schemas.microsoft.com/office/drawing/2014/main" id="{221DED5B-F56B-0F43-A308-4F2DD034B5B7}"/>
+                <a16:creationId xmlns:a16="http://schemas.microsoft.com/office/drawing/2014/main" id="{906B844D-ACD7-E643-84BC-965B55422B47}"/>
               </a:ext>
             </a:extLst>
           </p:cNvPr>
@@ -19334,8 +21665,8 @@
         </p:nvSpPr>
         <p:spPr>
           <a:xfrm>
-            <a:off x="1389412" y="1266033"/>
-            <a:ext cx="3212739" cy="2062103"/>
+            <a:off x="1389412" y="1607367"/>
+            <a:ext cx="1625766" cy="307777"/>
           </a:xfrm>
           <a:prstGeom prst="rect">
             <a:avLst/>
@@ -19349,125 +21680,23 @@
           <a:lstStyle/>
           <a:p>
             <a:r>
-              <a:rPr lang="en-US" sz="1600" b="1" dirty="0">
+              <a:rPr lang="en-US" sz="1400" b="1" dirty="0">
                 <a:solidFill>
                   <a:schemeClr val="bg1"/>
                 </a:solidFill>
                 <a:latin typeface="Comic Sans MS" panose="030F0902030302020204" pitchFamily="66" charset="0"/>
               </a:rPr>
-              <a:t>Answer This Question</a:t>
-            </a:r>
-          </a:p>
-          <a:p>
-            <a:endParaRPr lang="en-US" sz="1400" dirty="0">
-              <a:solidFill>
-                <a:schemeClr val="bg1"/>
-              </a:solidFill>
-              <a:latin typeface="Comic Sans MS" panose="030F0902030302020204" pitchFamily="66" charset="0"/>
-            </a:endParaRPr>
-          </a:p>
-          <a:p>
-            <a:r>
-              <a:rPr lang="en-US" sz="1400" dirty="0">
-                <a:solidFill>
-                  <a:schemeClr val="bg1"/>
-                </a:solidFill>
-                <a:latin typeface="Comic Sans MS" panose="030F0902030302020204" pitchFamily="66" charset="0"/>
-              </a:rPr>
-              <a:t>What does the M in MVC stand for?</a:t>
-            </a:r>
-          </a:p>
-          <a:p>
-            <a:endParaRPr lang="en-US" sz="1400" dirty="0">
-              <a:solidFill>
-                <a:schemeClr val="bg1"/>
-              </a:solidFill>
-              <a:latin typeface="Comic Sans MS" panose="030F0902030302020204" pitchFamily="66" charset="0"/>
-            </a:endParaRPr>
-          </a:p>
-          <a:p>
-            <a:pPr marL="285750" indent="-285750">
-              <a:buFont typeface=".PingFang SC Regular"/>
-              <a:buChar char="◎"/>
-            </a:pPr>
-            <a:r>
-              <a:rPr lang="en-US" sz="1400" dirty="0">
-                <a:solidFill>
-                  <a:schemeClr val="bg1"/>
-                </a:solidFill>
-                <a:latin typeface="Comic Sans MS" panose="030F0902030302020204" pitchFamily="66" charset="0"/>
-              </a:rPr>
-              <a:t>Model</a:t>
-            </a:r>
-          </a:p>
-          <a:p>
-            <a:pPr marL="285750" indent="-285750">
-              <a:buFont typeface=".PingFang SC Regular"/>
-              <a:buChar char="◎"/>
-            </a:pPr>
-            <a:r>
-              <a:rPr lang="en-US" sz="1400" dirty="0">
-                <a:solidFill>
-                  <a:schemeClr val="bg1"/>
-                </a:solidFill>
-                <a:latin typeface="Comic Sans MS" panose="030F0902030302020204" pitchFamily="66" charset="0"/>
-              </a:rPr>
-              <a:t>Main</a:t>
-            </a:r>
-          </a:p>
-          <a:p>
-            <a:pPr marL="285750" indent="-285750">
-              <a:buFont typeface=".PingFang SC Regular"/>
-              <a:buChar char="◎"/>
-            </a:pPr>
-            <a:r>
-              <a:rPr lang="en-US" sz="1400" dirty="0">
-                <a:solidFill>
-                  <a:schemeClr val="bg1"/>
-                </a:solidFill>
-                <a:latin typeface="Comic Sans MS" panose="030F0902030302020204" pitchFamily="66" charset="0"/>
-              </a:rPr>
-              <a:t>Mode</a:t>
-            </a:r>
-          </a:p>
-          <a:p>
-            <a:pPr marL="285750" indent="-285750">
-              <a:buFont typeface=".PingFang SC Regular"/>
-              <a:buChar char="◎"/>
-            </a:pPr>
-            <a:r>
-              <a:rPr lang="en-US" sz="1400" dirty="0">
-                <a:solidFill>
-                  <a:schemeClr val="bg1"/>
-                </a:solidFill>
-                <a:latin typeface="Comic Sans MS" panose="030F0902030302020204" pitchFamily="66" charset="0"/>
-              </a:rPr>
-              <a:t>Module</a:t>
-            </a:r>
-          </a:p>
-          <a:p>
-            <a:pPr marL="285750" indent="-285750">
-              <a:buFont typeface=".PingFang SC Regular"/>
-              <a:buChar char="◎"/>
-            </a:pPr>
-            <a:r>
-              <a:rPr lang="en-US" sz="1400" dirty="0">
-                <a:solidFill>
-                  <a:schemeClr val="bg1"/>
-                </a:solidFill>
-                <a:latin typeface="Comic Sans MS" panose="030F0902030302020204" pitchFamily="66" charset="0"/>
-              </a:rPr>
-              <a:t>Max</a:t>
+              <a:t>Quiz Meta-Data</a:t>
             </a:r>
           </a:p>
         </p:txBody>
       </p:sp>
       <p:sp>
         <p:nvSpPr>
-          <p:cNvPr id="7" name="TextBox 6">
+          <p:cNvPr id="20" name="TextBox 19">
             <a:extLst>
               <a:ext uri="{FF2B5EF4-FFF2-40B4-BE49-F238E27FC236}">
-                <a16:creationId xmlns:a16="http://schemas.microsoft.com/office/drawing/2014/main" id="{F3573DF9-457D-7948-8B22-DB5337292FA7}"/>
+                <a16:creationId xmlns:a16="http://schemas.microsoft.com/office/drawing/2014/main" id="{7ADE4FF2-4F4D-9246-9619-B237AFC3E7AF}"/>
               </a:ext>
             </a:extLst>
           </p:cNvPr>
@@ -19476,8 +21705,8 @@
         </p:nvSpPr>
         <p:spPr>
           <a:xfrm>
-            <a:off x="1784068" y="292529"/>
-            <a:ext cx="1771639" cy="276999"/>
+            <a:off x="1389412" y="4000861"/>
+            <a:ext cx="1510350" cy="307777"/>
           </a:xfrm>
           <a:prstGeom prst="rect">
             <a:avLst/>
@@ -19491,192 +21720,13 @@
           <a:lstStyle/>
           <a:p>
             <a:r>
-              <a:rPr lang="en-US" sz="1200" dirty="0">
+              <a:rPr lang="en-US" sz="1400" b="1" dirty="0">
                 <a:solidFill>
                   <a:schemeClr val="bg1"/>
                 </a:solidFill>
                 <a:latin typeface="Comic Sans MS" panose="030F0902030302020204" pitchFamily="66" charset="0"/>
               </a:rPr>
-              <a:t>Answer This Question</a:t>
-            </a:r>
-          </a:p>
-        </p:txBody>
-      </p:sp>
-      <p:sp>
-        <p:nvSpPr>
-          <p:cNvPr id="8" name="TextBox 7">
-            <a:extLst>
-              <a:ext uri="{FF2B5EF4-FFF2-40B4-BE49-F238E27FC236}">
-                <a16:creationId xmlns:a16="http://schemas.microsoft.com/office/drawing/2014/main" id="{49DF0299-C639-944C-9F0E-91BE71AC7E52}"/>
-              </a:ext>
-            </a:extLst>
-          </p:cNvPr>
-          <p:cNvSpPr txBox="1"/>
-          <p:nvPr/>
-        </p:nvSpPr>
-        <p:spPr>
-          <a:xfrm>
-            <a:off x="2233351" y="581403"/>
-            <a:ext cx="4188967" cy="276999"/>
-          </a:xfrm>
-          <a:prstGeom prst="rect">
-            <a:avLst/>
-          </a:prstGeom>
-          <a:noFill/>
-        </p:spPr>
-        <p:txBody>
-          <a:bodyPr wrap="none" rtlCol="0">
-            <a:spAutoFit/>
-          </a:bodyPr>
-          <a:lstStyle/>
-          <a:p>
-            <a:r>
-              <a:rPr lang="en-US" sz="1200" dirty="0">
-                <a:solidFill>
-                  <a:schemeClr val="bg1"/>
-                </a:solidFill>
-                <a:latin typeface="Comic Sans MS" panose="030F0902030302020204" pitchFamily="66" charset="0"/>
-              </a:rPr>
-              <a:t>http://localhost:3000/</a:t>
-            </a:r>
-            <a:r>
-              <a:rPr lang="en-US" sz="1200" dirty="0" err="1">
-                <a:solidFill>
-                  <a:schemeClr val="bg1"/>
-                </a:solidFill>
-                <a:latin typeface="Comic Sans MS" panose="030F0902030302020204" pitchFamily="66" charset="0"/>
-              </a:rPr>
-              <a:t>multiple_choice_questions</a:t>
-            </a:r>
-            <a:r>
-              <a:rPr lang="en-US" sz="1200" dirty="0">
-                <a:solidFill>
-                  <a:schemeClr val="bg1"/>
-                </a:solidFill>
-                <a:latin typeface="Comic Sans MS" panose="030F0902030302020204" pitchFamily="66" charset="0"/>
-              </a:rPr>
-              <a:t>/1/ask</a:t>
-            </a:r>
-          </a:p>
-        </p:txBody>
-      </p:sp>
-      <p:sp>
-        <p:nvSpPr>
-          <p:cNvPr id="6" name="Rounded Rectangle 5">
-            <a:extLst>
-              <a:ext uri="{FF2B5EF4-FFF2-40B4-BE49-F238E27FC236}">
-                <a16:creationId xmlns:a16="http://schemas.microsoft.com/office/drawing/2014/main" id="{33F8B4D0-A25F-4D49-8616-2DBF2C9B1E3B}"/>
-              </a:ext>
-            </a:extLst>
-          </p:cNvPr>
-          <p:cNvSpPr/>
-          <p:nvPr/>
-        </p:nvSpPr>
-        <p:spPr>
-          <a:xfrm>
-            <a:off x="1389412" y="3506781"/>
-            <a:ext cx="1544857" cy="327860"/>
-          </a:xfrm>
-          <a:prstGeom prst="roundRect">
-            <a:avLst/>
-          </a:prstGeom>
-          <a:solidFill>
-            <a:schemeClr val="tx2"/>
-          </a:solidFill>
-          <a:ln>
-            <a:solidFill>
-              <a:schemeClr val="bg1"/>
-            </a:solidFill>
-          </a:ln>
-        </p:spPr>
-        <p:style>
-          <a:lnRef idx="2">
-            <a:schemeClr val="accent1">
-              <a:shade val="50000"/>
-            </a:schemeClr>
-          </a:lnRef>
-          <a:fillRef idx="1">
-            <a:schemeClr val="accent1"/>
-          </a:fillRef>
-          <a:effectRef idx="0">
-            <a:schemeClr val="accent1"/>
-          </a:effectRef>
-          <a:fontRef idx="minor">
-            <a:schemeClr val="lt1"/>
-          </a:fontRef>
-        </p:style>
-        <p:txBody>
-          <a:bodyPr rtlCol="0" anchor="ctr"/>
-          <a:lstStyle/>
-          <a:p>
-            <a:pPr algn="ctr"/>
-            <a:r>
-              <a:rPr lang="en-US" sz="1400" dirty="0">
-                <a:solidFill>
-                  <a:schemeClr val="bg1"/>
-                </a:solidFill>
-                <a:latin typeface="Comic Sans MS" panose="030F0902030302020204" pitchFamily="66" charset="0"/>
-              </a:rPr>
-              <a:t>Submit Answer</a:t>
-            </a:r>
-          </a:p>
-        </p:txBody>
-      </p:sp>
-      <p:sp>
-        <p:nvSpPr>
-          <p:cNvPr id="9" name="Rectangle 8">
-            <a:extLst>
-              <a:ext uri="{FF2B5EF4-FFF2-40B4-BE49-F238E27FC236}">
-                <a16:creationId xmlns:a16="http://schemas.microsoft.com/office/drawing/2014/main" id="{02AE0571-ECA9-7940-B510-0DEBB21E22C3}"/>
-              </a:ext>
-            </a:extLst>
-          </p:cNvPr>
-          <p:cNvSpPr/>
-          <p:nvPr/>
-        </p:nvSpPr>
-        <p:spPr>
-          <a:xfrm>
-            <a:off x="1175657" y="870277"/>
-            <a:ext cx="9832769" cy="344384"/>
-          </a:xfrm>
-          <a:prstGeom prst="rect">
-            <a:avLst/>
-          </a:prstGeom>
-          <a:solidFill>
-            <a:schemeClr val="bg1"/>
-          </a:solidFill>
-          <a:ln>
-            <a:noFill/>
-          </a:ln>
-        </p:spPr>
-        <p:style>
-          <a:lnRef idx="2">
-            <a:schemeClr val="accent1">
-              <a:shade val="50000"/>
-            </a:schemeClr>
-          </a:lnRef>
-          <a:fillRef idx="1">
-            <a:schemeClr val="accent1"/>
-          </a:fillRef>
-          <a:effectRef idx="0">
-            <a:schemeClr val="accent1"/>
-          </a:effectRef>
-          <a:fontRef idx="minor">
-            <a:schemeClr val="lt1"/>
-          </a:fontRef>
-        </p:style>
-        <p:txBody>
-          <a:bodyPr rtlCol="0" anchor="ctr"/>
-          <a:lstStyle/>
-          <a:p>
-            <a:r>
-              <a:rPr lang="en-US" sz="1400" dirty="0">
-                <a:solidFill>
-                  <a:schemeClr val="tx1"/>
-                </a:solidFill>
-                <a:latin typeface="Comic Sans MS" panose="030F0902030302020204" pitchFamily="66" charset="0"/>
-              </a:rPr>
-              <a:t>Wapp  Home  About</a:t>
+              <a:t>Quiz Questions</a:t>
             </a:r>
           </a:p>
         </p:txBody>
@@ -19684,7 +21734,7 @@
     </p:spTree>
     <p:extLst>
       <p:ext uri="{BB962C8B-B14F-4D97-AF65-F5344CB8AC3E}">
-        <p14:creationId xmlns:p14="http://schemas.microsoft.com/office/powerpoint/2010/main" val="2382681040"/>
+        <p14:creationId xmlns:p14="http://schemas.microsoft.com/office/powerpoint/2010/main" val="3664061300"/>
       </p:ext>
     </p:extLst>
   </p:cSld>

</xml_diff>